<commit_message>
update spatial and project descriptions
</commit_message>
<xml_diff>
--- a/assets/PackagePresentation.pptx
+++ b/assets/PackagePresentation.pptx
@@ -2,7 +2,7 @@
 <file path=ppt/presentation.xml><?xml version="1.0" encoding="utf-8"?>
 <p:presentation xmlns:a="http://schemas.openxmlformats.org/drawingml/2006/main" xmlns:r="http://schemas.openxmlformats.org/officeDocument/2006/relationships" xmlns:p="http://schemas.openxmlformats.org/presentationml/2006/main" saveSubsetFonts="1" autoCompressPictures="0">
   <p:sldMasterIdLst>
-    <p:sldMasterId id="2147483661" r:id="rId1"/>
+    <p:sldMasterId id="2147483673" r:id="rId1"/>
   </p:sldMasterIdLst>
   <p:sldIdLst>
     <p:sldId id="256" r:id="rId2"/>
@@ -109,6 +109,11 @@
       </a:defRPr>
     </a:lvl9pPr>
   </p:defaultTextStyle>
+  <p:extLst>
+    <p:ext uri="{EFAFB233-063F-42B5-8137-9DF3F51BA10A}">
+      <p15:sldGuideLst xmlns:p15="http://schemas.microsoft.com/office/powerpoint/2012/main"/>
+    </p:ext>
+  </p:extLst>
 </p:presentation>
 </file>
 
@@ -137,7 +142,7 @@
         </p:nvSpPr>
         <p:spPr>
           <a:xfrm>
-            <a:off x="2382" y="6400800"/>
+            <a:off x="2383" y="6400800"/>
             <a:ext cx="9141619" cy="457200"/>
           </a:xfrm>
           <a:prstGeom prst="rect">
@@ -175,7 +180,7 @@
         </p:nvSpPr>
         <p:spPr>
           <a:xfrm>
-            <a:off x="12" y="6334316"/>
+            <a:off x="13" y="6334317"/>
             <a:ext cx="9141619" cy="64008"/>
           </a:xfrm>
           <a:prstGeom prst="rect">
@@ -217,7 +222,7 @@
         </p:nvSpPr>
         <p:spPr>
           <a:xfrm>
-            <a:off x="822960" y="758952"/>
+            <a:off x="822961" y="758952"/>
             <a:ext cx="7543800" cy="3566160"/>
           </a:xfrm>
         </p:spPr>
@@ -230,7 +235,7 @@
               <a:lnSpc>
                 <a:spcPct val="85000"/>
               </a:lnSpc>
-              <a:defRPr sz="8000" spc="-50" baseline="0">
+              <a:defRPr sz="7993" spc="-50" baseline="0">
                 <a:solidFill>
                   <a:schemeClr val="tx1">
                     <a:lumMod val="85000"/>
@@ -261,7 +266,7 @@
         </p:nvSpPr>
         <p:spPr>
           <a:xfrm>
-            <a:off x="825038" y="4455621"/>
+            <a:off x="825038" y="4455622"/>
             <a:ext cx="7543800" cy="1143000"/>
           </a:xfrm>
         </p:spPr>
@@ -272,44 +277,44 @@
           <a:lstStyle>
             <a:lvl1pPr marL="0" indent="0" algn="l">
               <a:buNone/>
-              <a:defRPr sz="2400" cap="all" spc="200" baseline="0">
+              <a:defRPr sz="2398" cap="all" spc="199" baseline="0">
                 <a:solidFill>
                   <a:schemeClr val="tx2"/>
                 </a:solidFill>
                 <a:latin typeface="+mj-lt"/>
               </a:defRPr>
             </a:lvl1pPr>
-            <a:lvl2pPr marL="457200" indent="0" algn="ctr">
-              <a:buNone/>
-              <a:defRPr sz="2400"/>
+            <a:lvl2pPr marL="456836" indent="0" algn="ctr">
+              <a:buNone/>
+              <a:defRPr sz="2398"/>
             </a:lvl2pPr>
-            <a:lvl3pPr marL="914400" indent="0" algn="ctr">
-              <a:buNone/>
-              <a:defRPr sz="2400"/>
+            <a:lvl3pPr marL="913671" indent="0" algn="ctr">
+              <a:buNone/>
+              <a:defRPr sz="2398"/>
             </a:lvl3pPr>
-            <a:lvl4pPr marL="1371600" indent="0" algn="ctr">
-              <a:buNone/>
-              <a:defRPr sz="2000"/>
+            <a:lvl4pPr marL="1370507" indent="0" algn="ctr">
+              <a:buNone/>
+              <a:defRPr sz="1999"/>
             </a:lvl4pPr>
-            <a:lvl5pPr marL="1828800" indent="0" algn="ctr">
-              <a:buNone/>
-              <a:defRPr sz="2000"/>
+            <a:lvl5pPr marL="1827343" indent="0" algn="ctr">
+              <a:buNone/>
+              <a:defRPr sz="1999"/>
             </a:lvl5pPr>
-            <a:lvl6pPr marL="2286000" indent="0" algn="ctr">
-              <a:buNone/>
-              <a:defRPr sz="2000"/>
+            <a:lvl6pPr marL="2284178" indent="0" algn="ctr">
+              <a:buNone/>
+              <a:defRPr sz="1999"/>
             </a:lvl6pPr>
-            <a:lvl7pPr marL="2743200" indent="0" algn="ctr">
-              <a:buNone/>
-              <a:defRPr sz="2000"/>
+            <a:lvl7pPr marL="2741013" indent="0" algn="ctr">
+              <a:buNone/>
+              <a:defRPr sz="1999"/>
             </a:lvl7pPr>
-            <a:lvl8pPr marL="3200400" indent="0" algn="ctr">
-              <a:buNone/>
-              <a:defRPr sz="2000"/>
+            <a:lvl8pPr marL="3197849" indent="0" algn="ctr">
+              <a:buNone/>
+              <a:defRPr sz="1999"/>
             </a:lvl8pPr>
-            <a:lvl9pPr marL="3657600" indent="0" algn="ctr">
-              <a:buNone/>
-              <a:defRPr sz="2000"/>
+            <a:lvl9pPr marL="3654684" indent="0" algn="ctr">
+              <a:buNone/>
+              <a:defRPr sz="1999"/>
             </a:lvl9pPr>
           </a:lstStyle>
           <a:p>
@@ -338,7 +343,7 @@
           <a:p>
             <a:fld id="{4BDF68E2-58F2-4D09-BE8B-E3BD06533059}" type="datetimeFigureOut">
               <a:rPr lang="en-US" smtClean="0"/>
-              <a:t>7/5/16</a:t>
+              <a:t>10/2/16</a:t>
             </a:fld>
             <a:endParaRPr lang="en-US" dirty="0"/>
           </a:p>
@@ -427,13 +432,20 @@
     </p:spTree>
     <p:extLst>
       <p:ext uri="{BB962C8B-B14F-4D97-AF65-F5344CB8AC3E}">
-        <p14:creationId xmlns:p14="http://schemas.microsoft.com/office/powerpoint/2010/main" val="1378162132"/>
+        <p14:creationId xmlns:p14="http://schemas.microsoft.com/office/powerpoint/2010/main" val="1233039353"/>
       </p:ext>
     </p:extLst>
   </p:cSld>
   <p:clrMapOvr>
     <a:masterClrMapping/>
   </p:clrMapOvr>
+  <p:timing>
+    <p:tnLst>
+      <p:par>
+        <p:cTn id="1" dur="indefinite" restart="never" nodeType="tmRoot"/>
+      </p:par>
+    </p:tnLst>
+  </p:timing>
 </p:sldLayout>
 </file>
 
@@ -546,7 +558,7 @@
           <a:p>
             <a:fld id="{2E2D6473-DF6D-4702-B328-E0DD40540A4E}" type="datetimeFigureOut">
               <a:rPr lang="en-US" smtClean="0"/>
-              <a:t>7/5/16</a:t>
+              <a:t>10/2/16</a:t>
             </a:fld>
             <a:endParaRPr lang="en-US" dirty="0"/>
           </a:p>
@@ -597,7 +609,7 @@
     </p:spTree>
     <p:extLst>
       <p:ext uri="{BB962C8B-B14F-4D97-AF65-F5344CB8AC3E}">
-        <p14:creationId xmlns:p14="http://schemas.microsoft.com/office/powerpoint/2010/main" val="1992269282"/>
+        <p14:creationId xmlns:p14="http://schemas.microsoft.com/office/powerpoint/2010/main" val="1606321419"/>
       </p:ext>
     </p:extLst>
   </p:cSld>
@@ -632,7 +644,7 @@
         </p:nvSpPr>
         <p:spPr>
           <a:xfrm>
-            <a:off x="2382" y="6400800"/>
+            <a:off x="2383" y="6400800"/>
             <a:ext cx="9141619" cy="457200"/>
           </a:xfrm>
           <a:prstGeom prst="rect">
@@ -670,7 +682,7 @@
         </p:nvSpPr>
         <p:spPr>
           <a:xfrm>
-            <a:off x="12" y="6334316"/>
+            <a:off x="13" y="6334317"/>
             <a:ext cx="9141619" cy="64008"/>
           </a:xfrm>
           <a:prstGeom prst="rect">
@@ -712,8 +724,8 @@
         </p:nvSpPr>
         <p:spPr>
           <a:xfrm>
-            <a:off x="6543675" y="414779"/>
-            <a:ext cx="1971675" cy="5757421"/>
+            <a:off x="6543676" y="412302"/>
+            <a:ext cx="1971675" cy="5759898"/>
           </a:xfrm>
         </p:spPr>
         <p:txBody>
@@ -740,8 +752,8 @@
         </p:nvSpPr>
         <p:spPr>
           <a:xfrm>
-            <a:off x="628650" y="414779"/>
-            <a:ext cx="5800725" cy="5757420"/>
+            <a:off x="628651" y="412302"/>
+            <a:ext cx="5800725" cy="5759898"/>
           </a:xfrm>
         </p:spPr>
         <p:txBody>
@@ -802,7 +814,7 @@
           <a:p>
             <a:fld id="{E26F7E3A-B166-407D-9866-32884E7D5B37}" type="datetimeFigureOut">
               <a:rPr lang="en-US" smtClean="0"/>
-              <a:t>7/5/16</a:t>
+              <a:t>10/2/16</a:t>
             </a:fld>
             <a:endParaRPr lang="en-US" dirty="0"/>
           </a:p>
@@ -853,13 +865,303 @@
     </p:spTree>
     <p:extLst>
       <p:ext uri="{BB962C8B-B14F-4D97-AF65-F5344CB8AC3E}">
-        <p14:creationId xmlns:p14="http://schemas.microsoft.com/office/powerpoint/2010/main" val="504798550"/>
+        <p14:creationId xmlns:p14="http://schemas.microsoft.com/office/powerpoint/2010/main" val="1427162696"/>
       </p:ext>
     </p:extLst>
   </p:cSld>
   <p:clrMapOvr>
     <a:masterClrMapping/>
   </p:clrMapOvr>
+</p:sldLayout>
+</file>
+
+<file path=ppt/slideLayouts/slideLayout12.xml><?xml version="1.0" encoding="utf-8"?>
+<p:sldLayout xmlns:a="http://schemas.openxmlformats.org/drawingml/2006/main" xmlns:r="http://schemas.openxmlformats.org/officeDocument/2006/relationships" xmlns:p="http://schemas.openxmlformats.org/presentationml/2006/main" matchingName="tx" type="tx">
+  <p:cSld name="tx">
+    <p:spTree>
+      <p:nvGrpSpPr>
+        <p:cNvPr id="1" name="Shape 10"/>
+        <p:cNvGrpSpPr/>
+        <p:nvPr/>
+      </p:nvGrpSpPr>
+      <p:grpSpPr>
+        <a:xfrm>
+          <a:off x="0" y="0"/>
+          <a:ext cx="0" cy="0"/>
+          <a:chOff x="0" y="0"/>
+          <a:chExt cx="0" cy="0"/>
+        </a:xfrm>
+      </p:grpSpPr>
+      <p:sp>
+        <p:nvSpPr>
+          <p:cNvPr id="11" name="Shape 11"/>
+          <p:cNvSpPr txBox="1">
+            <a:spLocks noGrp="1"/>
+          </p:cNvSpPr>
+          <p:nvPr>
+            <p:ph type="title"/>
+          </p:nvPr>
+        </p:nvSpPr>
+        <p:spPr>
+          <a:xfrm>
+            <a:off x="457200" y="274641"/>
+            <a:ext cx="8229600" cy="1143000"/>
+          </a:xfrm>
+          <a:prstGeom prst="rect">
+            <a:avLst/>
+          </a:prstGeom>
+          <a:noFill/>
+          <a:ln>
+            <a:noFill/>
+          </a:ln>
+        </p:spPr>
+        <p:txBody>
+          <a:bodyPr lIns="100726" tIns="100726" rIns="100726" bIns="100726" anchor="b" anchorCtr="0"/>
+          <a:lstStyle>
+            <a:lvl1pPr algn="l" rtl="0">
+              <a:spcBef>
+                <a:spcPts val="0"/>
+              </a:spcBef>
+              <a:buSzPct val="100000"/>
+              <a:buFont typeface="Arial"/>
+              <a:buNone/>
+              <a:defRPr sz="3627" b="1">
+                <a:solidFill>
+                  <a:schemeClr val="dk1"/>
+                </a:solidFill>
+                <a:latin typeface="Arial"/>
+                <a:ea typeface="Arial"/>
+                <a:cs typeface="Arial"/>
+                <a:sym typeface="Arial"/>
+              </a:defRPr>
+            </a:lvl1pPr>
+            <a:lvl2pPr algn="l" rtl="0">
+              <a:spcBef>
+                <a:spcPts val="0"/>
+              </a:spcBef>
+              <a:buSzPct val="100000"/>
+              <a:buFont typeface="Arial"/>
+              <a:buNone/>
+              <a:defRPr sz="3627" b="1">
+                <a:solidFill>
+                  <a:schemeClr val="dk1"/>
+                </a:solidFill>
+                <a:latin typeface="Arial"/>
+                <a:ea typeface="Arial"/>
+                <a:cs typeface="Arial"/>
+                <a:sym typeface="Arial"/>
+              </a:defRPr>
+            </a:lvl2pPr>
+            <a:lvl3pPr algn="l" rtl="0">
+              <a:spcBef>
+                <a:spcPts val="0"/>
+              </a:spcBef>
+              <a:buSzPct val="100000"/>
+              <a:buFont typeface="Arial"/>
+              <a:buNone/>
+              <a:defRPr sz="3627" b="1">
+                <a:solidFill>
+                  <a:schemeClr val="dk1"/>
+                </a:solidFill>
+                <a:latin typeface="Arial"/>
+                <a:ea typeface="Arial"/>
+                <a:cs typeface="Arial"/>
+                <a:sym typeface="Arial"/>
+              </a:defRPr>
+            </a:lvl3pPr>
+            <a:lvl4pPr algn="l" rtl="0">
+              <a:spcBef>
+                <a:spcPts val="0"/>
+              </a:spcBef>
+              <a:buSzPct val="100000"/>
+              <a:buFont typeface="Arial"/>
+              <a:buNone/>
+              <a:defRPr sz="3627" b="1">
+                <a:solidFill>
+                  <a:schemeClr val="dk1"/>
+                </a:solidFill>
+                <a:latin typeface="Arial"/>
+                <a:ea typeface="Arial"/>
+                <a:cs typeface="Arial"/>
+                <a:sym typeface="Arial"/>
+              </a:defRPr>
+            </a:lvl4pPr>
+            <a:lvl5pPr algn="l" rtl="0">
+              <a:spcBef>
+                <a:spcPts val="0"/>
+              </a:spcBef>
+              <a:buSzPct val="100000"/>
+              <a:buFont typeface="Arial"/>
+              <a:buNone/>
+              <a:defRPr sz="3627" b="1">
+                <a:solidFill>
+                  <a:schemeClr val="dk1"/>
+                </a:solidFill>
+                <a:latin typeface="Arial"/>
+                <a:ea typeface="Arial"/>
+                <a:cs typeface="Arial"/>
+                <a:sym typeface="Arial"/>
+              </a:defRPr>
+            </a:lvl5pPr>
+            <a:lvl6pPr algn="l" rtl="0">
+              <a:spcBef>
+                <a:spcPts val="0"/>
+              </a:spcBef>
+              <a:buSzPct val="100000"/>
+              <a:buFont typeface="Arial"/>
+              <a:buNone/>
+              <a:defRPr sz="3627" b="1">
+                <a:solidFill>
+                  <a:schemeClr val="dk1"/>
+                </a:solidFill>
+                <a:latin typeface="Arial"/>
+                <a:ea typeface="Arial"/>
+                <a:cs typeface="Arial"/>
+                <a:sym typeface="Arial"/>
+              </a:defRPr>
+            </a:lvl6pPr>
+            <a:lvl7pPr algn="l" rtl="0">
+              <a:spcBef>
+                <a:spcPts val="0"/>
+              </a:spcBef>
+              <a:buSzPct val="100000"/>
+              <a:buFont typeface="Arial"/>
+              <a:buNone/>
+              <a:defRPr sz="3627" b="1">
+                <a:solidFill>
+                  <a:schemeClr val="dk1"/>
+                </a:solidFill>
+                <a:latin typeface="Arial"/>
+                <a:ea typeface="Arial"/>
+                <a:cs typeface="Arial"/>
+                <a:sym typeface="Arial"/>
+              </a:defRPr>
+            </a:lvl7pPr>
+            <a:lvl8pPr algn="l" rtl="0">
+              <a:spcBef>
+                <a:spcPts val="0"/>
+              </a:spcBef>
+              <a:buSzPct val="100000"/>
+              <a:buFont typeface="Arial"/>
+              <a:buNone/>
+              <a:defRPr sz="3627" b="1">
+                <a:solidFill>
+                  <a:schemeClr val="dk1"/>
+                </a:solidFill>
+                <a:latin typeface="Arial"/>
+                <a:ea typeface="Arial"/>
+                <a:cs typeface="Arial"/>
+                <a:sym typeface="Arial"/>
+              </a:defRPr>
+            </a:lvl8pPr>
+            <a:lvl9pPr algn="l" rtl="0">
+              <a:spcBef>
+                <a:spcPts val="0"/>
+              </a:spcBef>
+              <a:buSzPct val="100000"/>
+              <a:buFont typeface="Arial"/>
+              <a:buNone/>
+              <a:defRPr sz="3627" b="1">
+                <a:solidFill>
+                  <a:schemeClr val="dk1"/>
+                </a:solidFill>
+                <a:latin typeface="Arial"/>
+                <a:ea typeface="Arial"/>
+                <a:cs typeface="Arial"/>
+                <a:sym typeface="Arial"/>
+              </a:defRPr>
+            </a:lvl9pPr>
+          </a:lstStyle>
+          <a:p>
+            <a:r>
+              <a:rPr lang="en-US" smtClean="0"/>
+              <a:t>Click to edit Master title style</a:t>
+            </a:r>
+            <a:endParaRPr/>
+          </a:p>
+        </p:txBody>
+      </p:sp>
+      <p:sp>
+        <p:nvSpPr>
+          <p:cNvPr id="12" name="Shape 12"/>
+          <p:cNvSpPr txBox="1">
+            <a:spLocks noGrp="1"/>
+          </p:cNvSpPr>
+          <p:nvPr>
+            <p:ph type="body" idx="1"/>
+          </p:nvPr>
+        </p:nvSpPr>
+        <p:spPr>
+          <a:xfrm>
+            <a:off x="457200" y="1600200"/>
+            <a:ext cx="8229600" cy="4967574"/>
+          </a:xfrm>
+          <a:prstGeom prst="rect">
+            <a:avLst/>
+          </a:prstGeom>
+          <a:noFill/>
+          <a:ln>
+            <a:noFill/>
+          </a:ln>
+        </p:spPr>
+        <p:txBody>
+          <a:bodyPr lIns="100726" tIns="100726" rIns="100726" bIns="100726" anchor="t" anchorCtr="0"/>
+          <a:lstStyle>
+            <a:lvl1pPr rtl="0">
+              <a:defRPr/>
+            </a:lvl1pPr>
+            <a:lvl2pPr marL="742248" indent="-285480" rtl="0">
+              <a:defRPr/>
+            </a:lvl2pPr>
+            <a:lvl3pPr marL="1141921" indent="-228385" rtl="0">
+              <a:defRPr/>
+            </a:lvl3pPr>
+            <a:lvl4pPr marL="1598687" indent="-228385" rtl="0">
+              <a:defRPr/>
+            </a:lvl4pPr>
+            <a:lvl5pPr rtl="0">
+              <a:defRPr sz="1814"/>
+            </a:lvl5pPr>
+            <a:lvl6pPr rtl="0">
+              <a:defRPr sz="1814"/>
+            </a:lvl6pPr>
+            <a:lvl7pPr rtl="0">
+              <a:defRPr sz="1814"/>
+            </a:lvl7pPr>
+            <a:lvl8pPr rtl="0">
+              <a:defRPr sz="1814"/>
+            </a:lvl8pPr>
+            <a:lvl9pPr rtl="0">
+              <a:defRPr sz="1814"/>
+            </a:lvl9pPr>
+          </a:lstStyle>
+          <a:p>
+            <a:pPr lvl="0"/>
+            <a:r>
+              <a:rPr lang="en-US" smtClean="0"/>
+              <a:t>Click to edit Master text styles</a:t>
+            </a:r>
+          </a:p>
+        </p:txBody>
+      </p:sp>
+    </p:spTree>
+    <p:extLst>
+      <p:ext uri="{BB962C8B-B14F-4D97-AF65-F5344CB8AC3E}">
+        <p14:creationId xmlns:p14="http://schemas.microsoft.com/office/powerpoint/2010/main" val="1078578329"/>
+      </p:ext>
+    </p:extLst>
+  </p:cSld>
+  <p:clrMapOvr>
+    <a:masterClrMapping/>
+  </p:clrMapOvr>
+  <p:timing>
+    <p:tnLst>
+      <p:par>
+        <p:cTn id="1" dur="indefinite" restart="never" nodeType="tmRoot"/>
+      </p:par>
+    </p:tnLst>
+  </p:timing>
+  <p:hf sldNum="0" hdr="0" ftr="0" dt="0"/>
 </p:sldLayout>
 </file>
 
@@ -972,7 +1274,7 @@
           <a:p>
             <a:fld id="{528FC5F6-F338-4AE4-BB23-26385BCFC423}" type="datetimeFigureOut">
               <a:rPr lang="en-US" smtClean="0"/>
-              <a:t>7/5/16</a:t>
+              <a:t>10/2/16</a:t>
             </a:fld>
             <a:endParaRPr lang="en-US" dirty="0"/>
           </a:p>
@@ -1023,13 +1325,20 @@
     </p:spTree>
     <p:extLst>
       <p:ext uri="{BB962C8B-B14F-4D97-AF65-F5344CB8AC3E}">
-        <p14:creationId xmlns:p14="http://schemas.microsoft.com/office/powerpoint/2010/main" val="12335982"/>
+        <p14:creationId xmlns:p14="http://schemas.microsoft.com/office/powerpoint/2010/main" val="475212321"/>
       </p:ext>
     </p:extLst>
   </p:cSld>
   <p:clrMapOvr>
     <a:masterClrMapping/>
   </p:clrMapOvr>
+  <p:timing>
+    <p:tnLst>
+      <p:par>
+        <p:cTn id="1" dur="indefinite" restart="never" nodeType="tmRoot"/>
+      </p:par>
+    </p:tnLst>
+  </p:timing>
 </p:sldLayout>
 </file>
 
@@ -1066,7 +1375,7 @@
         </p:nvSpPr>
         <p:spPr>
           <a:xfrm>
-            <a:off x="2382" y="6400800"/>
+            <a:off x="2383" y="6400800"/>
             <a:ext cx="9141619" cy="457200"/>
           </a:xfrm>
           <a:prstGeom prst="rect">
@@ -1104,7 +1413,7 @@
         </p:nvSpPr>
         <p:spPr>
           <a:xfrm>
-            <a:off x="12" y="6334316"/>
+            <a:off x="13" y="6334317"/>
             <a:ext cx="9141619" cy="64008"/>
           </a:xfrm>
           <a:prstGeom prst="rect">
@@ -1146,7 +1455,7 @@
         </p:nvSpPr>
         <p:spPr>
           <a:xfrm>
-            <a:off x="822960" y="758952"/>
+            <a:off x="822961" y="758952"/>
             <a:ext cx="7543800" cy="3566160"/>
           </a:xfrm>
         </p:spPr>
@@ -1159,7 +1468,7 @@
               <a:lnSpc>
                 <a:spcPct val="85000"/>
               </a:lnSpc>
-              <a:defRPr sz="8000" b="0">
+              <a:defRPr sz="7993" b="0">
                 <a:solidFill>
                   <a:schemeClr val="tx1">
                     <a:lumMod val="85000"/>
@@ -1190,7 +1499,7 @@
         </p:nvSpPr>
         <p:spPr>
           <a:xfrm>
-            <a:off x="822960" y="4453128"/>
+            <a:off x="822961" y="4453129"/>
             <a:ext cx="7543800" cy="1143000"/>
           </a:xfrm>
         </p:spPr>
@@ -1201,16 +1510,16 @@
           <a:lstStyle>
             <a:lvl1pPr marL="0" indent="0">
               <a:buNone/>
-              <a:defRPr sz="2400" cap="all" spc="200" baseline="0">
+              <a:defRPr sz="2398" cap="all" spc="199" baseline="0">
                 <a:solidFill>
                   <a:schemeClr val="tx2"/>
                 </a:solidFill>
                 <a:latin typeface="+mj-lt"/>
               </a:defRPr>
             </a:lvl1pPr>
-            <a:lvl2pPr marL="457200" indent="0">
-              <a:buNone/>
-              <a:defRPr sz="1800">
+            <a:lvl2pPr marL="456836" indent="0">
+              <a:buNone/>
+              <a:defRPr sz="1798">
                 <a:solidFill>
                   <a:schemeClr val="tx1">
                     <a:tint val="75000"/>
@@ -1218,9 +1527,9 @@
                 </a:solidFill>
               </a:defRPr>
             </a:lvl2pPr>
-            <a:lvl3pPr marL="914400" indent="0">
-              <a:buNone/>
-              <a:defRPr sz="1600">
+            <a:lvl3pPr marL="913671" indent="0">
+              <a:buNone/>
+              <a:defRPr sz="1599">
                 <a:solidFill>
                   <a:schemeClr val="tx1">
                     <a:tint val="75000"/>
@@ -1228,9 +1537,9 @@
                 </a:solidFill>
               </a:defRPr>
             </a:lvl3pPr>
-            <a:lvl4pPr marL="1371600" indent="0">
-              <a:buNone/>
-              <a:defRPr sz="1400">
+            <a:lvl4pPr marL="1370507" indent="0">
+              <a:buNone/>
+              <a:defRPr sz="1399">
                 <a:solidFill>
                   <a:schemeClr val="tx1">
                     <a:tint val="75000"/>
@@ -1238,9 +1547,9 @@
                 </a:solidFill>
               </a:defRPr>
             </a:lvl4pPr>
-            <a:lvl5pPr marL="1828800" indent="0">
-              <a:buNone/>
-              <a:defRPr sz="1400">
+            <a:lvl5pPr marL="1827343" indent="0">
+              <a:buNone/>
+              <a:defRPr sz="1399">
                 <a:solidFill>
                   <a:schemeClr val="tx1">
                     <a:tint val="75000"/>
@@ -1248,9 +1557,9 @@
                 </a:solidFill>
               </a:defRPr>
             </a:lvl5pPr>
-            <a:lvl6pPr marL="2286000" indent="0">
-              <a:buNone/>
-              <a:defRPr sz="1400">
+            <a:lvl6pPr marL="2284178" indent="0">
+              <a:buNone/>
+              <a:defRPr sz="1399">
                 <a:solidFill>
                   <a:schemeClr val="tx1">
                     <a:tint val="75000"/>
@@ -1258,9 +1567,9 @@
                 </a:solidFill>
               </a:defRPr>
             </a:lvl6pPr>
-            <a:lvl7pPr marL="2743200" indent="0">
-              <a:buNone/>
-              <a:defRPr sz="1400">
+            <a:lvl7pPr marL="2741013" indent="0">
+              <a:buNone/>
+              <a:defRPr sz="1399">
                 <a:solidFill>
                   <a:schemeClr val="tx1">
                     <a:tint val="75000"/>
@@ -1268,9 +1577,9 @@
                 </a:solidFill>
               </a:defRPr>
             </a:lvl7pPr>
-            <a:lvl8pPr marL="3200400" indent="0">
-              <a:buNone/>
-              <a:defRPr sz="1400">
+            <a:lvl8pPr marL="3197849" indent="0">
+              <a:buNone/>
+              <a:defRPr sz="1399">
                 <a:solidFill>
                   <a:schemeClr val="tx1">
                     <a:tint val="75000"/>
@@ -1278,9 +1587,9 @@
                 </a:solidFill>
               </a:defRPr>
             </a:lvl8pPr>
-            <a:lvl9pPr marL="3657600" indent="0">
-              <a:buNone/>
-              <a:defRPr sz="1400">
+            <a:lvl9pPr marL="3654684" indent="0">
+              <a:buNone/>
+              <a:defRPr sz="1399">
                 <a:solidFill>
                   <a:schemeClr val="tx1">
                     <a:tint val="75000"/>
@@ -1315,7 +1624,7 @@
           <a:p>
             <a:fld id="{20EBB0C4-6273-4C6E-B9BD-2EDC30F1CD52}" type="datetimeFigureOut">
               <a:rPr lang="en-US" smtClean="0"/>
-              <a:t>7/5/16</a:t>
+              <a:t>10/2/16</a:t>
             </a:fld>
             <a:endParaRPr lang="en-US" dirty="0"/>
           </a:p>
@@ -1404,7 +1713,7 @@
     </p:spTree>
     <p:extLst>
       <p:ext uri="{BB962C8B-B14F-4D97-AF65-F5344CB8AC3E}">
-        <p14:creationId xmlns:p14="http://schemas.microsoft.com/office/powerpoint/2010/main" val="1172419362"/>
+        <p14:creationId xmlns:p14="http://schemas.microsoft.com/office/powerpoint/2010/main" val="401795854"/>
       </p:ext>
     </p:extLst>
   </p:cSld>
@@ -1443,8 +1752,8 @@
         </p:nvSpPr>
         <p:spPr>
           <a:xfrm>
-            <a:off x="822960" y="286604"/>
-            <a:ext cx="7543800" cy="1450757"/>
+            <a:off x="822961" y="286605"/>
+            <a:ext cx="7543800" cy="793056"/>
           </a:xfrm>
         </p:spPr>
         <p:txBody>
@@ -1471,7 +1780,64 @@
         </p:nvSpPr>
         <p:spPr>
           <a:xfrm>
-            <a:off x="822960" y="1845734"/>
+            <a:off x="822960" y="1845736"/>
+            <a:ext cx="3703320" cy="4023359"/>
+          </a:xfrm>
+        </p:spPr>
+        <p:txBody>
+          <a:bodyPr/>
+          <a:lstStyle/>
+          <a:p>
+            <a:pPr lvl="0"/>
+            <a:r>
+              <a:rPr lang="en-US" smtClean="0"/>
+              <a:t>Click to edit Master text styles</a:t>
+            </a:r>
+          </a:p>
+          <a:p>
+            <a:pPr lvl="1"/>
+            <a:r>
+              <a:rPr lang="en-US" smtClean="0"/>
+              <a:t>Second level</a:t>
+            </a:r>
+          </a:p>
+          <a:p>
+            <a:pPr lvl="2"/>
+            <a:r>
+              <a:rPr lang="en-US" smtClean="0"/>
+              <a:t>Third level</a:t>
+            </a:r>
+          </a:p>
+          <a:p>
+            <a:pPr lvl="3"/>
+            <a:r>
+              <a:rPr lang="en-US" smtClean="0"/>
+              <a:t>Fourth level</a:t>
+            </a:r>
+          </a:p>
+          <a:p>
+            <a:pPr lvl="4"/>
+            <a:r>
+              <a:rPr lang="en-US" smtClean="0"/>
+              <a:t>Fifth level</a:t>
+            </a:r>
+            <a:endParaRPr lang="en-US" dirty="0"/>
+          </a:p>
+        </p:txBody>
+      </p:sp>
+      <p:sp>
+        <p:nvSpPr>
+          <p:cNvPr id="4" name="Content Placeholder 3"/>
+          <p:cNvSpPr>
+            <a:spLocks noGrp="1"/>
+          </p:cNvSpPr>
+          <p:nvPr>
+            <p:ph sz="half" idx="2"/>
+          </p:nvPr>
+        </p:nvSpPr>
+        <p:spPr>
+          <a:xfrm>
+            <a:off x="4663441" y="1845735"/>
             <a:ext cx="3703320" cy="4023360"/>
           </a:xfrm>
         </p:spPr>
@@ -1518,79 +1884,22 @@
       </p:sp>
       <p:sp>
         <p:nvSpPr>
-          <p:cNvPr id="4" name="Content Placeholder 3"/>
-          <p:cNvSpPr>
-            <a:spLocks noGrp="1"/>
-          </p:cNvSpPr>
-          <p:nvPr>
-            <p:ph sz="half" idx="2"/>
-          </p:nvPr>
-        </p:nvSpPr>
-        <p:spPr>
-          <a:xfrm>
-            <a:off x="4663440" y="1845736"/>
-            <a:ext cx="3703320" cy="4023359"/>
-          </a:xfrm>
-        </p:spPr>
+          <p:cNvPr id="5" name="Date Placeholder 4"/>
+          <p:cNvSpPr>
+            <a:spLocks noGrp="1"/>
+          </p:cNvSpPr>
+          <p:nvPr>
+            <p:ph type="dt" sz="half" idx="10"/>
+          </p:nvPr>
+        </p:nvSpPr>
+        <p:spPr/>
         <p:txBody>
           <a:bodyPr/>
           <a:lstStyle/>
           <a:p>
-            <a:pPr lvl="0"/>
-            <a:r>
-              <a:rPr lang="en-US" smtClean="0"/>
-              <a:t>Click to edit Master text styles</a:t>
-            </a:r>
-          </a:p>
-          <a:p>
-            <a:pPr lvl="1"/>
-            <a:r>
-              <a:rPr lang="en-US" smtClean="0"/>
-              <a:t>Second level</a:t>
-            </a:r>
-          </a:p>
-          <a:p>
-            <a:pPr lvl="2"/>
-            <a:r>
-              <a:rPr lang="en-US" smtClean="0"/>
-              <a:t>Third level</a:t>
-            </a:r>
-          </a:p>
-          <a:p>
-            <a:pPr lvl="3"/>
-            <a:r>
-              <a:rPr lang="en-US" smtClean="0"/>
-              <a:t>Fourth level</a:t>
-            </a:r>
-          </a:p>
-          <a:p>
-            <a:pPr lvl="4"/>
-            <a:r>
-              <a:rPr lang="en-US" smtClean="0"/>
-              <a:t>Fifth level</a:t>
-            </a:r>
-            <a:endParaRPr lang="en-US" dirty="0"/>
-          </a:p>
-        </p:txBody>
-      </p:sp>
-      <p:sp>
-        <p:nvSpPr>
-          <p:cNvPr id="5" name="Date Placeholder 4"/>
-          <p:cNvSpPr>
-            <a:spLocks noGrp="1"/>
-          </p:cNvSpPr>
-          <p:nvPr>
-            <p:ph type="dt" sz="half" idx="10"/>
-          </p:nvPr>
-        </p:nvSpPr>
-        <p:spPr/>
-        <p:txBody>
-          <a:bodyPr/>
-          <a:lstStyle/>
-          <a:p>
             <a:fld id="{19AB4D41-86C1-4908-B66A-0B50CEB3BF29}" type="datetimeFigureOut">
               <a:rPr lang="en-US" smtClean="0"/>
-              <a:t>7/5/16</a:t>
+              <a:t>10/2/16</a:t>
             </a:fld>
             <a:endParaRPr lang="en-US" dirty="0"/>
           </a:p>
@@ -1641,13 +1950,20 @@
     </p:spTree>
     <p:extLst>
       <p:ext uri="{BB962C8B-B14F-4D97-AF65-F5344CB8AC3E}">
-        <p14:creationId xmlns:p14="http://schemas.microsoft.com/office/powerpoint/2010/main" val="1689755909"/>
+        <p14:creationId xmlns:p14="http://schemas.microsoft.com/office/powerpoint/2010/main" val="1294332010"/>
       </p:ext>
     </p:extLst>
   </p:cSld>
   <p:clrMapOvr>
     <a:masterClrMapping/>
   </p:clrMapOvr>
+  <p:timing>
+    <p:tnLst>
+      <p:par>
+        <p:cTn id="1" dur="indefinite" restart="never" nodeType="tmRoot"/>
+      </p:par>
+    </p:tnLst>
+  </p:timing>
 </p:sldLayout>
 </file>
 
@@ -1680,8 +1996,8 @@
         </p:nvSpPr>
         <p:spPr>
           <a:xfrm>
-            <a:off x="822960" y="286604"/>
-            <a:ext cx="7543800" cy="1450757"/>
+            <a:off x="822961" y="286605"/>
+            <a:ext cx="7543800" cy="723957"/>
           </a:xfrm>
         </p:spPr>
         <p:txBody>
@@ -1719,43 +2035,43 @@
           <a:lstStyle>
             <a:lvl1pPr marL="0" indent="0">
               <a:buNone/>
-              <a:defRPr sz="2000" b="0" cap="all" baseline="0">
+              <a:defRPr sz="1999" b="0" cap="all" baseline="0">
                 <a:solidFill>
                   <a:schemeClr val="tx2"/>
                 </a:solidFill>
               </a:defRPr>
             </a:lvl1pPr>
-            <a:lvl2pPr marL="457200" indent="0">
-              <a:buNone/>
-              <a:defRPr sz="2000" b="1"/>
+            <a:lvl2pPr marL="456836" indent="0">
+              <a:buNone/>
+              <a:defRPr sz="1999" b="1"/>
             </a:lvl2pPr>
-            <a:lvl3pPr marL="914400" indent="0">
-              <a:buNone/>
-              <a:defRPr sz="1800" b="1"/>
+            <a:lvl3pPr marL="913671" indent="0">
+              <a:buNone/>
+              <a:defRPr sz="1798" b="1"/>
             </a:lvl3pPr>
-            <a:lvl4pPr marL="1371600" indent="0">
-              <a:buNone/>
-              <a:defRPr sz="1600" b="1"/>
+            <a:lvl4pPr marL="1370507" indent="0">
+              <a:buNone/>
+              <a:defRPr sz="1599" b="1"/>
             </a:lvl4pPr>
-            <a:lvl5pPr marL="1828800" indent="0">
-              <a:buNone/>
-              <a:defRPr sz="1600" b="1"/>
+            <a:lvl5pPr marL="1827343" indent="0">
+              <a:buNone/>
+              <a:defRPr sz="1599" b="1"/>
             </a:lvl5pPr>
-            <a:lvl6pPr marL="2286000" indent="0">
-              <a:buNone/>
-              <a:defRPr sz="1600" b="1"/>
+            <a:lvl6pPr marL="2284178" indent="0">
+              <a:buNone/>
+              <a:defRPr sz="1599" b="1"/>
             </a:lvl6pPr>
-            <a:lvl7pPr marL="2743200" indent="0">
-              <a:buNone/>
-              <a:defRPr sz="1600" b="1"/>
+            <a:lvl7pPr marL="2741013" indent="0">
+              <a:buNone/>
+              <a:defRPr sz="1599" b="1"/>
             </a:lvl7pPr>
-            <a:lvl8pPr marL="3200400" indent="0">
-              <a:buNone/>
-              <a:defRPr sz="1600" b="1"/>
+            <a:lvl8pPr marL="3197849" indent="0">
+              <a:buNone/>
+              <a:defRPr sz="1599" b="1"/>
             </a:lvl8pPr>
-            <a:lvl9pPr marL="3657600" indent="0">
-              <a:buNone/>
-              <a:defRPr sz="1600" b="1"/>
+            <a:lvl9pPr marL="3654684" indent="0">
+              <a:buNone/>
+              <a:defRPr sz="1599" b="1"/>
             </a:lvl9pPr>
           </a:lstStyle>
           <a:p>
@@ -1779,7 +2095,7 @@
         </p:nvSpPr>
         <p:spPr>
           <a:xfrm>
-            <a:off x="822960" y="2582334"/>
+            <a:off x="822960" y="2582335"/>
             <a:ext cx="3703320" cy="3286760"/>
           </a:xfrm>
         </p:spPr>
@@ -1836,7 +2152,7 @@
         </p:nvSpPr>
         <p:spPr>
           <a:xfrm>
-            <a:off x="4663440" y="1846052"/>
+            <a:off x="4663441" y="1846052"/>
             <a:ext cx="3703320" cy="736282"/>
           </a:xfrm>
         </p:spPr>
@@ -1847,43 +2163,43 @@
           <a:lstStyle>
             <a:lvl1pPr marL="0" indent="0">
               <a:buNone/>
-              <a:defRPr sz="2000" b="0" cap="all" baseline="0">
+              <a:defRPr sz="1999" b="0" cap="all" baseline="0">
                 <a:solidFill>
                   <a:schemeClr val="tx2"/>
                 </a:solidFill>
               </a:defRPr>
             </a:lvl1pPr>
-            <a:lvl2pPr marL="457200" indent="0">
-              <a:buNone/>
-              <a:defRPr sz="2000" b="1"/>
+            <a:lvl2pPr marL="456836" indent="0">
+              <a:buNone/>
+              <a:defRPr sz="1999" b="1"/>
             </a:lvl2pPr>
-            <a:lvl3pPr marL="914400" indent="0">
-              <a:buNone/>
-              <a:defRPr sz="1800" b="1"/>
+            <a:lvl3pPr marL="913671" indent="0">
+              <a:buNone/>
+              <a:defRPr sz="1798" b="1"/>
             </a:lvl3pPr>
-            <a:lvl4pPr marL="1371600" indent="0">
-              <a:buNone/>
-              <a:defRPr sz="1600" b="1"/>
+            <a:lvl4pPr marL="1370507" indent="0">
+              <a:buNone/>
+              <a:defRPr sz="1599" b="1"/>
             </a:lvl4pPr>
-            <a:lvl5pPr marL="1828800" indent="0">
-              <a:buNone/>
-              <a:defRPr sz="1600" b="1"/>
+            <a:lvl5pPr marL="1827343" indent="0">
+              <a:buNone/>
+              <a:defRPr sz="1599" b="1"/>
             </a:lvl5pPr>
-            <a:lvl6pPr marL="2286000" indent="0">
-              <a:buNone/>
-              <a:defRPr sz="1600" b="1"/>
+            <a:lvl6pPr marL="2284178" indent="0">
+              <a:buNone/>
+              <a:defRPr sz="1599" b="1"/>
             </a:lvl6pPr>
-            <a:lvl7pPr marL="2743200" indent="0">
-              <a:buNone/>
-              <a:defRPr sz="1600" b="1"/>
+            <a:lvl7pPr marL="2741013" indent="0">
+              <a:buNone/>
+              <a:defRPr sz="1599" b="1"/>
             </a:lvl7pPr>
-            <a:lvl8pPr marL="3200400" indent="0">
-              <a:buNone/>
-              <a:defRPr sz="1600" b="1"/>
+            <a:lvl8pPr marL="3197849" indent="0">
+              <a:buNone/>
+              <a:defRPr sz="1599" b="1"/>
             </a:lvl8pPr>
-            <a:lvl9pPr marL="3657600" indent="0">
-              <a:buNone/>
-              <a:defRPr sz="1600" b="1"/>
+            <a:lvl9pPr marL="3654684" indent="0">
+              <a:buNone/>
+              <a:defRPr sz="1599" b="1"/>
             </a:lvl9pPr>
           </a:lstStyle>
           <a:p>
@@ -1907,7 +2223,7 @@
         </p:nvSpPr>
         <p:spPr>
           <a:xfrm>
-            <a:off x="4663440" y="2582334"/>
+            <a:off x="4663441" y="2582334"/>
             <a:ext cx="3703320" cy="3286760"/>
           </a:xfrm>
         </p:spPr>
@@ -1969,7 +2285,7 @@
           <a:p>
             <a:fld id="{E6426E2C-56C1-4E0D-A793-0088A7FDD37E}" type="datetimeFigureOut">
               <a:rPr lang="en-US" smtClean="0"/>
-              <a:t>7/5/16</a:t>
+              <a:t>10/2/16</a:t>
             </a:fld>
             <a:endParaRPr lang="en-US" dirty="0"/>
           </a:p>
@@ -2020,13 +2336,20 @@
     </p:spTree>
     <p:extLst>
       <p:ext uri="{BB962C8B-B14F-4D97-AF65-F5344CB8AC3E}">
-        <p14:creationId xmlns:p14="http://schemas.microsoft.com/office/powerpoint/2010/main" val="1403814635"/>
+        <p14:creationId xmlns:p14="http://schemas.microsoft.com/office/powerpoint/2010/main" val="1976231607"/>
       </p:ext>
     </p:extLst>
   </p:cSld>
   <p:clrMapOvr>
     <a:masterClrMapping/>
   </p:clrMapOvr>
+  <p:timing>
+    <p:tnLst>
+      <p:par>
+        <p:cTn id="1" dur="indefinite" restart="never" nodeType="tmRoot"/>
+      </p:par>
+    </p:tnLst>
+  </p:timing>
 </p:sldLayout>
 </file>
 
@@ -2087,7 +2410,7 @@
           <a:p>
             <a:fld id="{C8C39B41-D8B5-4052-B551-9B5525EAA8B6}" type="datetimeFigureOut">
               <a:rPr lang="en-US" smtClean="0"/>
-              <a:t>7/5/16</a:t>
+              <a:t>10/2/16</a:t>
             </a:fld>
             <a:endParaRPr lang="en-US" dirty="0"/>
           </a:p>
@@ -2138,7 +2461,7 @@
     </p:spTree>
     <p:extLst>
       <p:ext uri="{BB962C8B-B14F-4D97-AF65-F5344CB8AC3E}">
-        <p14:creationId xmlns:p14="http://schemas.microsoft.com/office/powerpoint/2010/main" val="1657224503"/>
+        <p14:creationId xmlns:p14="http://schemas.microsoft.com/office/powerpoint/2010/main" val="1542534347"/>
       </p:ext>
     </p:extLst>
   </p:cSld>
@@ -2173,7 +2496,7 @@
         </p:nvSpPr>
         <p:spPr>
           <a:xfrm>
-            <a:off x="2382" y="6400800"/>
+            <a:off x="2383" y="6400800"/>
             <a:ext cx="9141619" cy="457200"/>
           </a:xfrm>
           <a:prstGeom prst="rect">
@@ -2211,7 +2534,7 @@
         </p:nvSpPr>
         <p:spPr>
           <a:xfrm>
-            <a:off x="12" y="6334316"/>
+            <a:off x="13" y="6334317"/>
             <a:ext cx="9141619" cy="64008"/>
           </a:xfrm>
           <a:prstGeom prst="rect">
@@ -2258,7 +2581,7 @@
           <a:p>
             <a:fld id="{4D94136C-8742-45B2-AF27-D93DF72833A9}" type="datetimeFigureOut">
               <a:rPr lang="en-US" smtClean="0"/>
-              <a:t>7/5/16</a:t>
+              <a:t>10/2/16</a:t>
             </a:fld>
             <a:endParaRPr lang="en-US" dirty="0"/>
           </a:p>
@@ -2318,7 +2641,7 @@
     </p:spTree>
     <p:extLst>
       <p:ext uri="{BB962C8B-B14F-4D97-AF65-F5344CB8AC3E}">
-        <p14:creationId xmlns:p14="http://schemas.microsoft.com/office/powerpoint/2010/main" val="109320331"/>
+        <p14:creationId xmlns:p14="http://schemas.microsoft.com/office/powerpoint/2010/main" val="952183445"/>
       </p:ext>
     </p:extLst>
   </p:cSld>
@@ -2443,7 +2766,7 @@
           </a:bodyPr>
           <a:lstStyle>
             <a:lvl1pPr>
-              <a:defRPr sz="3600" b="0">
+              <a:defRPr sz="3597" b="0">
                 <a:solidFill>
                   <a:srgbClr val="FFFFFF"/>
                 </a:solidFill>
@@ -2471,8 +2794,8 @@
         </p:nvSpPr>
         <p:spPr>
           <a:xfrm>
-            <a:off x="3460237" y="731520"/>
-            <a:ext cx="5009393" cy="5257800"/>
+            <a:off x="3600450" y="731520"/>
+            <a:ext cx="4869180" cy="5257800"/>
           </a:xfrm>
         </p:spPr>
         <p:txBody>
@@ -2528,7 +2851,7 @@
         </p:nvSpPr>
         <p:spPr>
           <a:xfrm>
-            <a:off x="342900" y="2926080"/>
+            <a:off x="342900" y="2926081"/>
             <a:ext cx="2400300" cy="3379124"/>
           </a:xfrm>
         </p:spPr>
@@ -2539,41 +2862,41 @@
           <a:lstStyle>
             <a:lvl1pPr marL="0" indent="0">
               <a:buNone/>
-              <a:defRPr sz="1500">
+              <a:defRPr sz="1499">
                 <a:solidFill>
                   <a:srgbClr val="FFFFFF"/>
                 </a:solidFill>
               </a:defRPr>
             </a:lvl1pPr>
-            <a:lvl2pPr marL="457200" indent="0">
-              <a:buNone/>
-              <a:defRPr sz="1200"/>
+            <a:lvl2pPr marL="456836" indent="0">
+              <a:buNone/>
+              <a:defRPr sz="1199"/>
             </a:lvl2pPr>
-            <a:lvl3pPr marL="914400" indent="0">
-              <a:buNone/>
-              <a:defRPr sz="1000"/>
+            <a:lvl3pPr marL="913671" indent="0">
+              <a:buNone/>
+              <a:defRPr sz="999"/>
             </a:lvl3pPr>
-            <a:lvl4pPr marL="1371600" indent="0">
+            <a:lvl4pPr marL="1370507" indent="0">
               <a:buNone/>
               <a:defRPr sz="900"/>
             </a:lvl4pPr>
-            <a:lvl5pPr marL="1828800" indent="0">
+            <a:lvl5pPr marL="1827343" indent="0">
               <a:buNone/>
               <a:defRPr sz="900"/>
             </a:lvl5pPr>
-            <a:lvl6pPr marL="2286000" indent="0">
+            <a:lvl6pPr marL="2284178" indent="0">
               <a:buNone/>
               <a:defRPr sz="900"/>
             </a:lvl6pPr>
-            <a:lvl7pPr marL="2743200" indent="0">
+            <a:lvl7pPr marL="2741013" indent="0">
               <a:buNone/>
               <a:defRPr sz="900"/>
             </a:lvl7pPr>
-            <a:lvl8pPr marL="3200400" indent="0">
+            <a:lvl8pPr marL="3197849" indent="0">
               <a:buNone/>
               <a:defRPr sz="900"/>
             </a:lvl8pPr>
-            <a:lvl9pPr marL="3657600" indent="0">
+            <a:lvl9pPr marL="3654684" indent="0">
               <a:buNone/>
               <a:defRPr sz="900"/>
             </a:lvl9pPr>
@@ -2599,7 +2922,7 @@
         </p:nvSpPr>
         <p:spPr>
           <a:xfrm>
-            <a:off x="349134" y="6459786"/>
+            <a:off x="349135" y="6459787"/>
             <a:ext cx="1963883" cy="365125"/>
           </a:xfrm>
         </p:spPr>
@@ -2613,7 +2936,7 @@
           <a:p>
             <a:fld id="{32ABBEA6-7C60-4B02-AE87-00D78D8422AF}" type="datetimeFigureOut">
               <a:rPr lang="en-US" smtClean="0"/>
-              <a:t>7/5/16</a:t>
+              <a:t>10/2/16</a:t>
             </a:fld>
             <a:endParaRPr lang="en-US" dirty="0"/>
           </a:p>
@@ -2631,7 +2954,7 @@
         </p:nvSpPr>
         <p:spPr>
           <a:xfrm>
-            <a:off x="3600450" y="6459786"/>
+            <a:off x="3600451" y="6459787"/>
             <a:ext cx="3486150" cy="365125"/>
           </a:xfrm>
         </p:spPr>
@@ -2686,7 +3009,7 @@
     </p:spTree>
     <p:extLst>
       <p:ext uri="{BB962C8B-B14F-4D97-AF65-F5344CB8AC3E}">
-        <p14:creationId xmlns:p14="http://schemas.microsoft.com/office/powerpoint/2010/main" val="1248284932"/>
+        <p14:creationId xmlns:p14="http://schemas.microsoft.com/office/powerpoint/2010/main" val="299022671"/>
       </p:ext>
     </p:extLst>
   </p:cSld>
@@ -2721,7 +3044,7 @@
         </p:nvSpPr>
         <p:spPr>
           <a:xfrm>
-            <a:off x="0" y="4953000"/>
+            <a:off x="1" y="4953000"/>
             <a:ext cx="9141619" cy="1905000"/>
           </a:xfrm>
           <a:prstGeom prst="rect">
@@ -2759,7 +3082,7 @@
         </p:nvSpPr>
         <p:spPr>
           <a:xfrm>
-            <a:off x="12" y="4915076"/>
+            <a:off x="13" y="4915076"/>
             <a:ext cx="9141619" cy="64008"/>
           </a:xfrm>
           <a:prstGeom prst="rect">
@@ -2811,7 +3134,7 @@
           </a:bodyPr>
           <a:lstStyle>
             <a:lvl1pPr>
-              <a:defRPr sz="3600" b="0">
+              <a:defRPr sz="3597" b="0">
                 <a:solidFill>
                   <a:srgbClr val="FFFFFF"/>
                 </a:solidFill>
@@ -2839,58 +3162,53 @@
         </p:nvSpPr>
         <p:spPr>
           <a:xfrm>
-            <a:off x="12" y="0"/>
+            <a:off x="13" y="1"/>
             <a:ext cx="9143989" cy="4915076"/>
           </a:xfrm>
-          <a:blipFill>
-            <a:blip r:embed="rId2"/>
-            <a:stretch>
-              <a:fillRect/>
-            </a:stretch>
-          </a:blipFill>
+          <a:solidFill>
+            <a:schemeClr val="bg2">
+              <a:lumMod val="90000"/>
+            </a:schemeClr>
+          </a:solidFill>
         </p:spPr>
         <p:txBody>
           <a:bodyPr lIns="457200" tIns="457200" anchor="t"/>
           <a:lstStyle>
             <a:lvl1pPr marL="0" indent="0">
               <a:buNone/>
-              <a:defRPr sz="3200">
-                <a:solidFill>
-                  <a:schemeClr val="bg1"/>
-                </a:solidFill>
-              </a:defRPr>
+              <a:defRPr sz="3197"/>
             </a:lvl1pPr>
-            <a:lvl2pPr marL="457200" indent="0">
-              <a:buNone/>
-              <a:defRPr sz="2800"/>
+            <a:lvl2pPr marL="456836" indent="0">
+              <a:buNone/>
+              <a:defRPr sz="2797"/>
             </a:lvl2pPr>
-            <a:lvl3pPr marL="914400" indent="0">
-              <a:buNone/>
-              <a:defRPr sz="2400"/>
+            <a:lvl3pPr marL="913671" indent="0">
+              <a:buNone/>
+              <a:defRPr sz="2398"/>
             </a:lvl3pPr>
-            <a:lvl4pPr marL="1371600" indent="0">
-              <a:buNone/>
-              <a:defRPr sz="2000"/>
+            <a:lvl4pPr marL="1370507" indent="0">
+              <a:buNone/>
+              <a:defRPr sz="1999"/>
             </a:lvl4pPr>
-            <a:lvl5pPr marL="1828800" indent="0">
-              <a:buNone/>
-              <a:defRPr sz="2000"/>
+            <a:lvl5pPr marL="1827343" indent="0">
+              <a:buNone/>
+              <a:defRPr sz="1999"/>
             </a:lvl5pPr>
-            <a:lvl6pPr marL="2286000" indent="0">
-              <a:buNone/>
-              <a:defRPr sz="2000"/>
+            <a:lvl6pPr marL="2284178" indent="0">
+              <a:buNone/>
+              <a:defRPr sz="1999"/>
             </a:lvl6pPr>
-            <a:lvl7pPr marL="2743200" indent="0">
-              <a:buNone/>
-              <a:defRPr sz="2000"/>
+            <a:lvl7pPr marL="2741013" indent="0">
+              <a:buNone/>
+              <a:defRPr sz="1999"/>
             </a:lvl7pPr>
-            <a:lvl8pPr marL="3200400" indent="0">
-              <a:buNone/>
-              <a:defRPr sz="2000"/>
+            <a:lvl8pPr marL="3197849" indent="0">
+              <a:buNone/>
+              <a:defRPr sz="1999"/>
             </a:lvl8pPr>
-            <a:lvl9pPr marL="3657600" indent="0">
-              <a:buNone/>
-              <a:defRPr sz="2000"/>
+            <a:lvl9pPr marL="3654684" indent="0">
+              <a:buNone/>
+              <a:defRPr sz="1999"/>
             </a:lvl9pPr>
           </a:lstStyle>
           <a:p>
@@ -2914,7 +3232,7 @@
         </p:nvSpPr>
         <p:spPr>
           <a:xfrm>
-            <a:off x="822959" y="5907024"/>
+            <a:off x="822960" y="5907025"/>
             <a:ext cx="7589520" cy="594360"/>
           </a:xfrm>
         </p:spPr>
@@ -2928,44 +3246,44 @@
                 <a:spcPts val="0"/>
               </a:spcBef>
               <a:spcAft>
-                <a:spcPts val="600"/>
+                <a:spcPts val="599"/>
               </a:spcAft>
               <a:buNone/>
-              <a:defRPr sz="1500">
+              <a:defRPr sz="1499">
                 <a:solidFill>
                   <a:srgbClr val="FFFFFF"/>
                 </a:solidFill>
               </a:defRPr>
             </a:lvl1pPr>
-            <a:lvl2pPr marL="457200" indent="0">
-              <a:buNone/>
-              <a:defRPr sz="1200"/>
+            <a:lvl2pPr marL="456836" indent="0">
+              <a:buNone/>
+              <a:defRPr sz="1199"/>
             </a:lvl2pPr>
-            <a:lvl3pPr marL="914400" indent="0">
-              <a:buNone/>
-              <a:defRPr sz="1000"/>
+            <a:lvl3pPr marL="913671" indent="0">
+              <a:buNone/>
+              <a:defRPr sz="999"/>
             </a:lvl3pPr>
-            <a:lvl4pPr marL="1371600" indent="0">
+            <a:lvl4pPr marL="1370507" indent="0">
               <a:buNone/>
               <a:defRPr sz="900"/>
             </a:lvl4pPr>
-            <a:lvl5pPr marL="1828800" indent="0">
+            <a:lvl5pPr marL="1827343" indent="0">
               <a:buNone/>
               <a:defRPr sz="900"/>
             </a:lvl5pPr>
-            <a:lvl6pPr marL="2286000" indent="0">
+            <a:lvl6pPr marL="2284178" indent="0">
               <a:buNone/>
               <a:defRPr sz="900"/>
             </a:lvl6pPr>
-            <a:lvl7pPr marL="2743200" indent="0">
+            <a:lvl7pPr marL="2741013" indent="0">
               <a:buNone/>
               <a:defRPr sz="900"/>
             </a:lvl7pPr>
-            <a:lvl8pPr marL="3200400" indent="0">
+            <a:lvl8pPr marL="3197849" indent="0">
               <a:buNone/>
               <a:defRPr sz="900"/>
             </a:lvl8pPr>
-            <a:lvl9pPr marL="3657600" indent="0">
+            <a:lvl9pPr marL="3654684" indent="0">
               <a:buNone/>
               <a:defRPr sz="900"/>
             </a:lvl9pPr>
@@ -2996,7 +3314,7 @@
           <a:p>
             <a:fld id="{C9CAD897-D46E-4AD2-BD9B-49DD3E640873}" type="datetimeFigureOut">
               <a:rPr lang="en-US" smtClean="0"/>
-              <a:t>7/5/16</a:t>
+              <a:t>10/2/16</a:t>
             </a:fld>
             <a:endParaRPr lang="en-US" dirty="0"/>
           </a:p>
@@ -3047,7 +3365,7 @@
     </p:spTree>
     <p:extLst>
       <p:ext uri="{BB962C8B-B14F-4D97-AF65-F5344CB8AC3E}">
-        <p14:creationId xmlns:p14="http://schemas.microsoft.com/office/powerpoint/2010/main" val="1157104581"/>
+        <p14:creationId xmlns:p14="http://schemas.microsoft.com/office/powerpoint/2010/main" val="562297517"/>
       </p:ext>
     </p:extLst>
   </p:cSld>
@@ -3087,7 +3405,7 @@
         </p:nvSpPr>
         <p:spPr>
           <a:xfrm>
-            <a:off x="0" y="6400800"/>
+            <a:off x="1" y="6400800"/>
             <a:ext cx="9144001" cy="457200"/>
           </a:xfrm>
           <a:prstGeom prst="rect">
@@ -3125,8 +3443,8 @@
         </p:nvSpPr>
         <p:spPr>
           <a:xfrm>
-            <a:off x="0" y="6334315"/>
-            <a:ext cx="9144001" cy="65999"/>
+            <a:off x="1" y="6334316"/>
+            <a:ext cx="9144001" cy="66484"/>
           </a:xfrm>
           <a:prstGeom prst="rect">
             <a:avLst/>
@@ -3167,8 +3485,8 @@
         </p:nvSpPr>
         <p:spPr>
           <a:xfrm>
-            <a:off x="822960" y="286604"/>
-            <a:ext cx="7543800" cy="1450757"/>
+            <a:off x="822961" y="286605"/>
+            <a:ext cx="7543800" cy="654859"/>
           </a:xfrm>
           <a:prstGeom prst="rect">
             <a:avLst/>
@@ -3200,8 +3518,8 @@
         </p:nvSpPr>
         <p:spPr>
           <a:xfrm>
-            <a:off x="822959" y="1845734"/>
-            <a:ext cx="7543801" cy="4023360"/>
+            <a:off x="822959" y="1146145"/>
+            <a:ext cx="7543801" cy="4722949"/>
           </a:xfrm>
           <a:prstGeom prst="rect">
             <a:avLst/>
@@ -3262,7 +3580,7 @@
         </p:nvSpPr>
         <p:spPr>
           <a:xfrm>
-            <a:off x="822961" y="6459786"/>
+            <a:off x="822962" y="6459787"/>
             <a:ext cx="1854203" cy="365125"/>
           </a:xfrm>
           <a:prstGeom prst="rect">
@@ -3283,7 +3601,7 @@
           <a:p>
             <a:fld id="{98624D31-43A5-475A-80CF-332C9F6DCF35}" type="datetimeFigureOut">
               <a:rPr lang="en-US" smtClean="0"/>
-              <a:t>7/5/16</a:t>
+              <a:t>10/2/16</a:t>
             </a:fld>
             <a:endParaRPr lang="en-US" dirty="0"/>
           </a:p>
@@ -3301,7 +3619,7 @@
         </p:nvSpPr>
         <p:spPr>
           <a:xfrm>
-            <a:off x="2764639" y="6459786"/>
+            <a:off x="2764640" y="6459787"/>
             <a:ext cx="3617103" cy="365125"/>
           </a:xfrm>
           <a:prstGeom prst="rect">
@@ -3336,7 +3654,7 @@
         </p:nvSpPr>
         <p:spPr>
           <a:xfrm>
-            <a:off x="7425344" y="6459786"/>
+            <a:off x="7425345" y="6459787"/>
             <a:ext cx="984019" cy="365125"/>
           </a:xfrm>
           <a:prstGeom prst="rect">
@@ -3347,7 +3665,7 @@
           <a:bodyPr vert="horz" lIns="91440" tIns="45720" rIns="91440" bIns="45720" rtlCol="0" anchor="ctr"/>
           <a:lstStyle>
             <a:lvl1pPr algn="r">
-              <a:defRPr sz="1050">
+              <a:defRPr sz="1049">
                 <a:solidFill>
                   <a:srgbClr val="FFFFFF"/>
                 </a:solidFill>
@@ -3372,7 +3690,7 @@
         </p:nvCxnSpPr>
         <p:spPr>
           <a:xfrm>
-            <a:off x="895149" y="1737845"/>
+            <a:off x="822959" y="1079660"/>
             <a:ext cx="7475220" cy="0"/>
           </a:xfrm>
           <a:prstGeom prst="line">
@@ -3405,28 +3723,36 @@
     </p:spTree>
     <p:extLst>
       <p:ext uri="{BB962C8B-B14F-4D97-AF65-F5344CB8AC3E}">
-        <p14:creationId xmlns:p14="http://schemas.microsoft.com/office/powerpoint/2010/main" val="1112219660"/>
+        <p14:creationId xmlns:p14="http://schemas.microsoft.com/office/powerpoint/2010/main" val="1255828067"/>
       </p:ext>
     </p:extLst>
   </p:cSld>
   <p:clrMap bg1="lt1" tx1="dk1" bg2="lt2" tx2="dk2" accent1="accent1" accent2="accent2" accent3="accent3" accent4="accent4" accent5="accent5" accent6="accent6" hlink="hlink" folHlink="folHlink"/>
   <p:sldLayoutIdLst>
-    <p:sldLayoutId id="2147483662" r:id="rId1"/>
-    <p:sldLayoutId id="2147483663" r:id="rId2"/>
-    <p:sldLayoutId id="2147483664" r:id="rId3"/>
-    <p:sldLayoutId id="2147483665" r:id="rId4"/>
-    <p:sldLayoutId id="2147483666" r:id="rId5"/>
-    <p:sldLayoutId id="2147483667" r:id="rId6"/>
-    <p:sldLayoutId id="2147483668" r:id="rId7"/>
-    <p:sldLayoutId id="2147483669" r:id="rId8"/>
-    <p:sldLayoutId id="2147483670" r:id="rId9"/>
-    <p:sldLayoutId id="2147483671" r:id="rId10"/>
-    <p:sldLayoutId id="2147483672" r:id="rId11"/>
+    <p:sldLayoutId id="2147483674" r:id="rId1"/>
+    <p:sldLayoutId id="2147483675" r:id="rId2"/>
+    <p:sldLayoutId id="2147483676" r:id="rId3"/>
+    <p:sldLayoutId id="2147483677" r:id="rId4"/>
+    <p:sldLayoutId id="2147483678" r:id="rId5"/>
+    <p:sldLayoutId id="2147483679" r:id="rId6"/>
+    <p:sldLayoutId id="2147483680" r:id="rId7"/>
+    <p:sldLayoutId id="2147483681" r:id="rId8"/>
+    <p:sldLayoutId id="2147483682" r:id="rId9"/>
+    <p:sldLayoutId id="2147483683" r:id="rId10"/>
+    <p:sldLayoutId id="2147483684" r:id="rId11"/>
+    <p:sldLayoutId id="2147483685" r:id="rId12"/>
   </p:sldLayoutIdLst>
+  <p:timing>
+    <p:tnLst>
+      <p:par>
+        <p:cTn id="1" dur="indefinite" restart="never" nodeType="tmRoot"/>
+      </p:par>
+    </p:tnLst>
+  </p:timing>
   <p:hf sldNum="0" hdr="0" ftr="0" dt="0"/>
   <p:txStyles>
     <p:titleStyle>
-      <a:lvl1pPr algn="l" defTabSz="914400" rtl="0" eaLnBrk="1" latinLnBrk="0" hangingPunct="1">
+      <a:lvl1pPr algn="l" defTabSz="913671" rtl="0" eaLnBrk="1" latinLnBrk="0" hangingPunct="1">
         <a:lnSpc>
           <a:spcPct val="85000"/>
         </a:lnSpc>
@@ -3434,7 +3760,7 @@
           <a:spcPct val="0"/>
         </a:spcBef>
         <a:buNone/>
-        <a:defRPr sz="4800" kern="1200" spc="-50" baseline="0">
+        <a:defRPr sz="4796" kern="1200" spc="-50" baseline="0">
           <a:solidFill>
             <a:schemeClr val="tx1">
               <a:lumMod val="75000"/>
@@ -3448,15 +3774,15 @@
       </a:lvl1pPr>
     </p:titleStyle>
     <p:bodyStyle>
-      <a:lvl1pPr marL="91440" indent="-91440" algn="l" defTabSz="914400" rtl="0" eaLnBrk="1" latinLnBrk="0" hangingPunct="1">
+      <a:lvl1pPr marL="91367" indent="-91367" algn="l" defTabSz="913671" rtl="0" eaLnBrk="1" latinLnBrk="0" hangingPunct="1">
         <a:lnSpc>
           <a:spcPct val="90000"/>
         </a:lnSpc>
         <a:spcBef>
-          <a:spcPts val="1200"/>
+          <a:spcPts val="1199"/>
         </a:spcBef>
         <a:spcAft>
-          <a:spcPts val="200"/>
+          <a:spcPts val="199"/>
         </a:spcAft>
         <a:buClr>
           <a:schemeClr val="accent1"/>
@@ -3464,7 +3790,7 @@
         <a:buSzPct val="100000"/>
         <a:buFont typeface="Calibri" panose="020F0502020204030204" pitchFamily="34" charset="0"/>
         <a:buChar char=" "/>
-        <a:defRPr sz="2000" kern="1200">
+        <a:defRPr sz="1999" kern="1200">
           <a:solidFill>
             <a:schemeClr val="tx1">
               <a:lumMod val="75000"/>
@@ -3476,12 +3802,12 @@
           <a:cs typeface="+mn-cs"/>
         </a:defRPr>
       </a:lvl1pPr>
-      <a:lvl2pPr marL="384048" indent="-182880" algn="l" defTabSz="914400" rtl="0" eaLnBrk="1" latinLnBrk="0" hangingPunct="1">
+      <a:lvl2pPr marL="383741" indent="-182734" algn="l" defTabSz="913671" rtl="0" eaLnBrk="1" latinLnBrk="0" hangingPunct="1">
         <a:lnSpc>
           <a:spcPct val="90000"/>
         </a:lnSpc>
         <a:spcBef>
-          <a:spcPts val="200"/>
+          <a:spcPts val="199"/>
         </a:spcBef>
         <a:spcAft>
           <a:spcPts val="400"/>
@@ -3491,7 +3817,7 @@
         </a:buClr>
         <a:buFont typeface="Calibri" pitchFamily="34" charset="0"/>
         <a:buChar char="◦"/>
-        <a:defRPr sz="1800" kern="1200">
+        <a:defRPr sz="1798" kern="1200">
           <a:solidFill>
             <a:schemeClr val="tx1">
               <a:lumMod val="75000"/>
@@ -3503,12 +3829,12 @@
           <a:cs typeface="+mn-cs"/>
         </a:defRPr>
       </a:lvl2pPr>
-      <a:lvl3pPr marL="566928" indent="-182880" algn="l" defTabSz="914400" rtl="0" eaLnBrk="1" latinLnBrk="0" hangingPunct="1">
+      <a:lvl3pPr marL="566476" indent="-182734" algn="l" defTabSz="913671" rtl="0" eaLnBrk="1" latinLnBrk="0" hangingPunct="1">
         <a:lnSpc>
           <a:spcPct val="90000"/>
         </a:lnSpc>
         <a:spcBef>
-          <a:spcPts val="200"/>
+          <a:spcPts val="199"/>
         </a:spcBef>
         <a:spcAft>
           <a:spcPts val="400"/>
@@ -3518,7 +3844,7 @@
         </a:buClr>
         <a:buFont typeface="Calibri" pitchFamily="34" charset="0"/>
         <a:buChar char="◦"/>
-        <a:defRPr sz="1400" kern="1200">
+        <a:defRPr sz="1399" kern="1200">
           <a:solidFill>
             <a:schemeClr val="tx1">
               <a:lumMod val="75000"/>
@@ -3530,12 +3856,12 @@
           <a:cs typeface="+mn-cs"/>
         </a:defRPr>
       </a:lvl3pPr>
-      <a:lvl4pPr marL="749808" indent="-182880" algn="l" defTabSz="914400" rtl="0" eaLnBrk="1" latinLnBrk="0" hangingPunct="1">
+      <a:lvl4pPr marL="749210" indent="-182734" algn="l" defTabSz="913671" rtl="0" eaLnBrk="1" latinLnBrk="0" hangingPunct="1">
         <a:lnSpc>
           <a:spcPct val="90000"/>
         </a:lnSpc>
         <a:spcBef>
-          <a:spcPts val="200"/>
+          <a:spcPts val="199"/>
         </a:spcBef>
         <a:spcAft>
           <a:spcPts val="400"/>
@@ -3545,7 +3871,7 @@
         </a:buClr>
         <a:buFont typeface="Calibri" pitchFamily="34" charset="0"/>
         <a:buChar char="◦"/>
-        <a:defRPr sz="1400" kern="1200">
+        <a:defRPr sz="1399" kern="1200">
           <a:solidFill>
             <a:schemeClr val="tx1">
               <a:lumMod val="75000"/>
@@ -3557,12 +3883,12 @@
           <a:cs typeface="+mn-cs"/>
         </a:defRPr>
       </a:lvl4pPr>
-      <a:lvl5pPr marL="932688" indent="-182880" algn="l" defTabSz="914400" rtl="0" eaLnBrk="1" latinLnBrk="0" hangingPunct="1">
+      <a:lvl5pPr marL="931945" indent="-182734" algn="l" defTabSz="913671" rtl="0" eaLnBrk="1" latinLnBrk="0" hangingPunct="1">
         <a:lnSpc>
           <a:spcPct val="90000"/>
         </a:lnSpc>
         <a:spcBef>
-          <a:spcPts val="200"/>
+          <a:spcPts val="199"/>
         </a:spcBef>
         <a:spcAft>
           <a:spcPts val="400"/>
@@ -3572,7 +3898,7 @@
         </a:buClr>
         <a:buFont typeface="Calibri" pitchFamily="34" charset="0"/>
         <a:buChar char="◦"/>
-        <a:defRPr sz="1400" kern="1200">
+        <a:defRPr sz="1399" kern="1200">
           <a:solidFill>
             <a:schemeClr val="tx1">
               <a:lumMod val="75000"/>
@@ -3584,12 +3910,12 @@
           <a:cs typeface="+mn-cs"/>
         </a:defRPr>
       </a:lvl5pPr>
-      <a:lvl6pPr marL="1100000" indent="-228600" algn="l" defTabSz="914400" rtl="0" eaLnBrk="1" latinLnBrk="0" hangingPunct="1">
+      <a:lvl6pPr marL="1099123" indent="-228417" algn="l" defTabSz="913671" rtl="0" eaLnBrk="1" latinLnBrk="0" hangingPunct="1">
         <a:lnSpc>
           <a:spcPct val="90000"/>
         </a:lnSpc>
         <a:spcBef>
-          <a:spcPts val="200"/>
+          <a:spcPts val="199"/>
         </a:spcBef>
         <a:spcAft>
           <a:spcPts val="400"/>
@@ -3599,7 +3925,7 @@
         </a:buClr>
         <a:buFont typeface="Calibri" pitchFamily="34" charset="0"/>
         <a:buChar char="◦"/>
-        <a:defRPr sz="1400" kern="1200">
+        <a:defRPr sz="1399" kern="1200">
           <a:solidFill>
             <a:schemeClr val="tx1">
               <a:lumMod val="75000"/>
@@ -3611,12 +3937,12 @@
           <a:cs typeface="+mn-cs"/>
         </a:defRPr>
       </a:lvl6pPr>
-      <a:lvl7pPr marL="1300000" indent="-228600" algn="l" defTabSz="914400" rtl="0" eaLnBrk="1" latinLnBrk="0" hangingPunct="1">
+      <a:lvl7pPr marL="1298964" indent="-228417" algn="l" defTabSz="913671" rtl="0" eaLnBrk="1" latinLnBrk="0" hangingPunct="1">
         <a:lnSpc>
           <a:spcPct val="90000"/>
         </a:lnSpc>
         <a:spcBef>
-          <a:spcPts val="200"/>
+          <a:spcPts val="199"/>
         </a:spcBef>
         <a:spcAft>
           <a:spcPts val="400"/>
@@ -3626,7 +3952,7 @@
         </a:buClr>
         <a:buFont typeface="Calibri" pitchFamily="34" charset="0"/>
         <a:buChar char="◦"/>
-        <a:defRPr sz="1400" kern="1200">
+        <a:defRPr sz="1399" kern="1200">
           <a:solidFill>
             <a:schemeClr val="tx1">
               <a:lumMod val="75000"/>
@@ -3638,12 +3964,12 @@
           <a:cs typeface="+mn-cs"/>
         </a:defRPr>
       </a:lvl7pPr>
-      <a:lvl8pPr marL="1500000" indent="-228600" algn="l" defTabSz="914400" rtl="0" eaLnBrk="1" latinLnBrk="0" hangingPunct="1">
+      <a:lvl8pPr marL="1498804" indent="-228417" algn="l" defTabSz="913671" rtl="0" eaLnBrk="1" latinLnBrk="0" hangingPunct="1">
         <a:lnSpc>
           <a:spcPct val="90000"/>
         </a:lnSpc>
         <a:spcBef>
-          <a:spcPts val="200"/>
+          <a:spcPts val="199"/>
         </a:spcBef>
         <a:spcAft>
           <a:spcPts val="400"/>
@@ -3653,7 +3979,7 @@
         </a:buClr>
         <a:buFont typeface="Calibri" pitchFamily="34" charset="0"/>
         <a:buChar char="◦"/>
-        <a:defRPr sz="1400" kern="1200">
+        <a:defRPr sz="1399" kern="1200">
           <a:solidFill>
             <a:schemeClr val="tx1">
               <a:lumMod val="75000"/>
@@ -3665,12 +3991,12 @@
           <a:cs typeface="+mn-cs"/>
         </a:defRPr>
       </a:lvl8pPr>
-      <a:lvl9pPr marL="1700000" indent="-228600" algn="l" defTabSz="914400" rtl="0" eaLnBrk="1" latinLnBrk="0" hangingPunct="1">
+      <a:lvl9pPr marL="1698645" indent="-228417" algn="l" defTabSz="913671" rtl="0" eaLnBrk="1" latinLnBrk="0" hangingPunct="1">
         <a:lnSpc>
           <a:spcPct val="90000"/>
         </a:lnSpc>
         <a:spcBef>
-          <a:spcPts val="200"/>
+          <a:spcPts val="199"/>
         </a:spcBef>
         <a:spcAft>
           <a:spcPts val="400"/>
@@ -3680,7 +4006,7 @@
         </a:buClr>
         <a:buFont typeface="Calibri" pitchFamily="34" charset="0"/>
         <a:buChar char="◦"/>
-        <a:defRPr sz="1400" kern="1200">
+        <a:defRPr sz="1399" kern="1200">
           <a:solidFill>
             <a:schemeClr val="tx1">
               <a:lumMod val="75000"/>
@@ -3697,8 +4023,8 @@
       <a:defPPr>
         <a:defRPr lang="en-US"/>
       </a:defPPr>
-      <a:lvl1pPr marL="0" algn="l" defTabSz="914400" rtl="0" eaLnBrk="1" latinLnBrk="0" hangingPunct="1">
-        <a:defRPr sz="1800" kern="1200">
+      <a:lvl1pPr marL="0" algn="l" defTabSz="913671" rtl="0" eaLnBrk="1" latinLnBrk="0" hangingPunct="1">
+        <a:defRPr sz="1798" kern="1200">
           <a:solidFill>
             <a:schemeClr val="tx1"/>
           </a:solidFill>
@@ -3707,8 +4033,8 @@
           <a:cs typeface="+mn-cs"/>
         </a:defRPr>
       </a:lvl1pPr>
-      <a:lvl2pPr marL="457200" algn="l" defTabSz="914400" rtl="0" eaLnBrk="1" latinLnBrk="0" hangingPunct="1">
-        <a:defRPr sz="1800" kern="1200">
+      <a:lvl2pPr marL="456836" algn="l" defTabSz="913671" rtl="0" eaLnBrk="1" latinLnBrk="0" hangingPunct="1">
+        <a:defRPr sz="1798" kern="1200">
           <a:solidFill>
             <a:schemeClr val="tx1"/>
           </a:solidFill>
@@ -3717,8 +4043,8 @@
           <a:cs typeface="+mn-cs"/>
         </a:defRPr>
       </a:lvl2pPr>
-      <a:lvl3pPr marL="914400" algn="l" defTabSz="914400" rtl="0" eaLnBrk="1" latinLnBrk="0" hangingPunct="1">
-        <a:defRPr sz="1800" kern="1200">
+      <a:lvl3pPr marL="913671" algn="l" defTabSz="913671" rtl="0" eaLnBrk="1" latinLnBrk="0" hangingPunct="1">
+        <a:defRPr sz="1798" kern="1200">
           <a:solidFill>
             <a:schemeClr val="tx1"/>
           </a:solidFill>
@@ -3727,8 +4053,8 @@
           <a:cs typeface="+mn-cs"/>
         </a:defRPr>
       </a:lvl3pPr>
-      <a:lvl4pPr marL="1371600" algn="l" defTabSz="914400" rtl="0" eaLnBrk="1" latinLnBrk="0" hangingPunct="1">
-        <a:defRPr sz="1800" kern="1200">
+      <a:lvl4pPr marL="1370507" algn="l" defTabSz="913671" rtl="0" eaLnBrk="1" latinLnBrk="0" hangingPunct="1">
+        <a:defRPr sz="1798" kern="1200">
           <a:solidFill>
             <a:schemeClr val="tx1"/>
           </a:solidFill>
@@ -3737,8 +4063,8 @@
           <a:cs typeface="+mn-cs"/>
         </a:defRPr>
       </a:lvl4pPr>
-      <a:lvl5pPr marL="1828800" algn="l" defTabSz="914400" rtl="0" eaLnBrk="1" latinLnBrk="0" hangingPunct="1">
-        <a:defRPr sz="1800" kern="1200">
+      <a:lvl5pPr marL="1827343" algn="l" defTabSz="913671" rtl="0" eaLnBrk="1" latinLnBrk="0" hangingPunct="1">
+        <a:defRPr sz="1798" kern="1200">
           <a:solidFill>
             <a:schemeClr val="tx1"/>
           </a:solidFill>
@@ -3747,8 +4073,8 @@
           <a:cs typeface="+mn-cs"/>
         </a:defRPr>
       </a:lvl5pPr>
-      <a:lvl6pPr marL="2286000" algn="l" defTabSz="914400" rtl="0" eaLnBrk="1" latinLnBrk="0" hangingPunct="1">
-        <a:defRPr sz="1800" kern="1200">
+      <a:lvl6pPr marL="2284178" algn="l" defTabSz="913671" rtl="0" eaLnBrk="1" latinLnBrk="0" hangingPunct="1">
+        <a:defRPr sz="1798" kern="1200">
           <a:solidFill>
             <a:schemeClr val="tx1"/>
           </a:solidFill>
@@ -3757,8 +4083,8 @@
           <a:cs typeface="+mn-cs"/>
         </a:defRPr>
       </a:lvl6pPr>
-      <a:lvl7pPr marL="2743200" algn="l" defTabSz="914400" rtl="0" eaLnBrk="1" latinLnBrk="0" hangingPunct="1">
-        <a:defRPr sz="1800" kern="1200">
+      <a:lvl7pPr marL="2741013" algn="l" defTabSz="913671" rtl="0" eaLnBrk="1" latinLnBrk="0" hangingPunct="1">
+        <a:defRPr sz="1798" kern="1200">
           <a:solidFill>
             <a:schemeClr val="tx1"/>
           </a:solidFill>
@@ -3767,8 +4093,8 @@
           <a:cs typeface="+mn-cs"/>
         </a:defRPr>
       </a:lvl7pPr>
-      <a:lvl8pPr marL="3200400" algn="l" defTabSz="914400" rtl="0" eaLnBrk="1" latinLnBrk="0" hangingPunct="1">
-        <a:defRPr sz="1800" kern="1200">
+      <a:lvl8pPr marL="3197849" algn="l" defTabSz="913671" rtl="0" eaLnBrk="1" latinLnBrk="0" hangingPunct="1">
+        <a:defRPr sz="1798" kern="1200">
           <a:solidFill>
             <a:schemeClr val="tx1"/>
           </a:solidFill>
@@ -3777,8 +4103,8 @@
           <a:cs typeface="+mn-cs"/>
         </a:defRPr>
       </a:lvl8pPr>
-      <a:lvl9pPr marL="3657600" algn="l" defTabSz="914400" rtl="0" eaLnBrk="1" latinLnBrk="0" hangingPunct="1">
-        <a:defRPr sz="1800" kern="1200">
+      <a:lvl9pPr marL="3654684" algn="l" defTabSz="913671" rtl="0" eaLnBrk="1" latinLnBrk="0" hangingPunct="1">
+        <a:defRPr sz="1798" kern="1200">
           <a:solidFill>
             <a:schemeClr val="tx1"/>
           </a:solidFill>
@@ -3904,12 +4230,30 @@
         </p:nvSpPr>
         <p:spPr/>
         <p:txBody>
-          <a:bodyPr/>
+          <a:bodyPr>
+            <a:normAutofit fontScale="90000"/>
+          </a:bodyPr>
           <a:lstStyle/>
           <a:p>
             <a:r>
               <a:rPr lang="en-US" dirty="0" smtClean="0"/>
-              <a:t>Lead Author</a:t>
+              <a:t>Lead </a:t>
+            </a:r>
+            <a:r>
+              <a:rPr lang="en-US" dirty="0"/>
+              <a:t>Author: </a:t>
+            </a:r>
+            <a:r>
+              <a:rPr lang="en-US" dirty="0" err="1"/>
+              <a:t>Yihui</a:t>
+            </a:r>
+            <a:r>
+              <a:rPr lang="en-US" dirty="0"/>
+              <a:t> </a:t>
+            </a:r>
+            <a:r>
+              <a:rPr lang="en-US" dirty="0" err="1"/>
+              <a:t>Xie</a:t>
             </a:r>
             <a:endParaRPr lang="en-US" dirty="0"/>
           </a:p>
@@ -3925,49 +4269,159 @@
             <p:ph idx="1"/>
           </p:nvPr>
         </p:nvSpPr>
-        <p:spPr/>
-        <p:txBody>
-          <a:bodyPr/>
+        <p:spPr>
+          <a:xfrm>
+            <a:off x="328613" y="1414463"/>
+            <a:ext cx="8038147" cy="4454631"/>
+          </a:xfrm>
+        </p:spPr>
+        <p:txBody>
+          <a:bodyPr>
+            <a:normAutofit/>
+          </a:bodyPr>
           <a:lstStyle/>
           <a:p>
             <a:r>
+              <a:rPr lang="en-US" dirty="0" smtClean="0"/>
+              <a:t>Software </a:t>
+            </a:r>
+            <a:r>
+              <a:rPr lang="en-US" dirty="0"/>
+              <a:t>engineer </a:t>
+            </a:r>
+            <a:r>
+              <a:rPr lang="en-US" dirty="0" smtClean="0"/>
+              <a:t>at </a:t>
+            </a:r>
+            <a:r>
               <a:rPr lang="en-US" dirty="0" err="1" smtClean="0"/>
-              <a:t>Yihui</a:t>
-            </a:r>
+              <a:t>Rstudio</a:t>
+            </a:r>
+            <a:endParaRPr lang="en-US" dirty="0" smtClean="0"/>
+          </a:p>
+          <a:p>
             <a:r>
               <a:rPr lang="en-US" dirty="0" smtClean="0"/>
-              <a:t> </a:t>
-            </a:r>
-            <a:r>
-              <a:rPr lang="en-US" dirty="0" err="1" smtClean="0"/>
-              <a:t>Xie</a:t>
+              <a:t>PhD Department </a:t>
+            </a:r>
+            <a:r>
+              <a:rPr lang="en-US" dirty="0"/>
+              <a:t>of Statistics, Iowa State </a:t>
             </a:r>
             <a:r>
               <a:rPr lang="en-US" dirty="0" smtClean="0"/>
-              <a:t> ~ </a:t>
+              <a:t>University</a:t>
+            </a:r>
+          </a:p>
+          <a:p>
+            <a:r>
+              <a:rPr lang="en-US" dirty="0"/>
+              <a:t>Founded Chinese website </a:t>
+            </a:r>
+            <a:r>
+              <a:rPr lang="en-US" i="1" dirty="0"/>
+              <a:t>Capital of Statistics</a:t>
+            </a:r>
+            <a:r>
+              <a:rPr lang="en-US" dirty="0"/>
+              <a:t> &amp; initiated 1</a:t>
+            </a:r>
+            <a:r>
+              <a:rPr lang="en-US" baseline="30000" dirty="0"/>
+              <a:t>st</a:t>
+            </a:r>
+            <a:r>
+              <a:rPr lang="en-US" dirty="0"/>
+              <a:t> Chinese R conference</a:t>
             </a:r>
           </a:p>
           <a:p>
             <a:r>
               <a:rPr lang="en-US" dirty="0" smtClean="0"/>
-              <a:t>Author of </a:t>
-            </a:r>
-            <a:r>
-              <a:rPr lang="en-US" dirty="0" err="1" smtClean="0"/>
+              <a:t>R packages: </a:t>
+            </a:r>
+            <a:r>
+              <a:rPr lang="en-US" b="1" dirty="0" smtClean="0">
+                <a:latin typeface="Courier New" charset="0"/>
+                <a:ea typeface="Courier New" charset="0"/>
+                <a:cs typeface="Courier New" charset="0"/>
+              </a:rPr>
+              <a:t>animation</a:t>
+            </a:r>
+            <a:r>
+              <a:rPr lang="en-US" dirty="0"/>
+              <a:t>, </a:t>
+            </a:r>
+            <a:r>
+              <a:rPr lang="en-US" b="1" dirty="0" err="1">
+                <a:latin typeface="Courier New" charset="0"/>
+                <a:ea typeface="Courier New" charset="0"/>
+                <a:cs typeface="Courier New" charset="0"/>
+              </a:rPr>
+              <a:t>formatR</a:t>
+            </a:r>
+            <a:r>
+              <a:rPr lang="en-US" dirty="0"/>
+              <a:t>, and </a:t>
+            </a:r>
+            <a:r>
+              <a:rPr lang="en-US" b="1" dirty="0" err="1" smtClean="0">
+                <a:latin typeface="Courier New" charset="0"/>
+                <a:ea typeface="Courier New" charset="0"/>
+                <a:cs typeface="Courier New" charset="0"/>
+              </a:rPr>
               <a:t>knitr</a:t>
             </a:r>
-            <a:r>
-              <a:rPr lang="en-US" dirty="0" smtClean="0"/>
-              <a:t> package</a:t>
-            </a:r>
-            <a:r>
-              <a:rPr lang="is-IS" dirty="0" smtClean="0"/>
-              <a:t>…</a:t>
-            </a:r>
-            <a:endParaRPr lang="en-US" dirty="0"/>
-          </a:p>
-        </p:txBody>
-      </p:sp>
+            <a:endParaRPr lang="en-US" b="1" dirty="0" smtClean="0"/>
+          </a:p>
+          <a:p>
+            <a:endParaRPr lang="en-US" dirty="0"/>
+          </a:p>
+          <a:p>
+            <a:endParaRPr lang="en-US" dirty="0" smtClean="0"/>
+          </a:p>
+          <a:p>
+            <a:pPr algn="ctr"/>
+            <a:r>
+              <a:rPr lang="en-US" sz="3200" i="1" dirty="0" smtClean="0"/>
+              <a:t>“I </a:t>
+            </a:r>
+            <a:r>
+              <a:rPr lang="en-US" sz="3200" i="1" dirty="0"/>
+              <a:t>know I cannot eat code, so I cook almost every day to stay away from my computer for two hours</a:t>
+            </a:r>
+            <a:r>
+              <a:rPr lang="en-US" sz="3200" i="1" dirty="0" smtClean="0"/>
+              <a:t>.”</a:t>
+            </a:r>
+            <a:endParaRPr lang="en-US" sz="3200" i="1" dirty="0"/>
+          </a:p>
+        </p:txBody>
+      </p:sp>
+      <p:pic>
+        <p:nvPicPr>
+          <p:cNvPr id="4" name="Picture 3"/>
+          <p:cNvPicPr>
+            <a:picLocks noChangeAspect="1"/>
+          </p:cNvPicPr>
+          <p:nvPr/>
+        </p:nvPicPr>
+        <p:blipFill>
+          <a:blip r:embed="rId2"/>
+          <a:stretch>
+            <a:fillRect/>
+          </a:stretch>
+        </p:blipFill>
+        <p:spPr>
+          <a:xfrm>
+            <a:off x="6986587" y="115927"/>
+            <a:ext cx="1724023" cy="1999867"/>
+          </a:xfrm>
+          <a:prstGeom prst="rect">
+            <a:avLst/>
+          </a:prstGeom>
+        </p:spPr>
+      </p:pic>
     </p:spTree>
     <p:extLst>
       <p:ext uri="{BB962C8B-B14F-4D97-AF65-F5344CB8AC3E}">
@@ -4017,7 +4471,9 @@
         </p:nvSpPr>
         <p:spPr/>
         <p:txBody>
-          <a:bodyPr/>
+          <a:bodyPr>
+            <a:normAutofit fontScale="90000"/>
+          </a:bodyPr>
           <a:lstStyle/>
           <a:p>
             <a:r>
@@ -4040,7 +4496,7 @@
         </p:nvSpPr>
         <p:spPr>
           <a:xfrm>
-            <a:off x="822959" y="1845733"/>
+            <a:off x="633846" y="1359958"/>
             <a:ext cx="7922030" cy="4430375"/>
           </a:xfrm>
         </p:spPr>
@@ -4052,8 +4508,9 @@
           <a:p>
             <a:r>
               <a:rPr lang="en-US" dirty="0" smtClean="0"/>
-              <a:t>Make animations</a:t>
-            </a:r>
+              <a:t>Makes animations!</a:t>
+            </a:r>
+            <a:endParaRPr lang="en-US" dirty="0" smtClean="0"/>
           </a:p>
           <a:p>
             <a:pPr lvl="1"/>
@@ -4128,14 +4585,21 @@
           </a:p>
           <a:p>
             <a:r>
-              <a:rPr lang="en-US" dirty="0" smtClean="0"/>
+              <a:rPr lang="en-US" sz="3200" dirty="0" smtClean="0">
+                <a:solidFill>
+                  <a:srgbClr val="C00000"/>
+                </a:solidFill>
+              </a:rPr>
               <a:t>Save to </a:t>
             </a:r>
             <a:r>
-              <a:rPr lang="en-US" dirty="0"/>
+              <a:rPr lang="en-US" sz="3200" dirty="0">
+                <a:solidFill>
+                  <a:srgbClr val="C00000"/>
+                </a:solidFill>
+              </a:rPr>
               <a:t>Flash, GIF, HTML pages, PDF and videos</a:t>
             </a:r>
-            <a:endParaRPr lang="en-US" dirty="0"/>
           </a:p>
         </p:txBody>
       </p:sp>
@@ -4188,7 +4652,9 @@
         </p:nvSpPr>
         <p:spPr/>
         <p:txBody>
-          <a:bodyPr/>
+          <a:bodyPr>
+            <a:normAutofit fontScale="90000"/>
+          </a:bodyPr>
           <a:lstStyle/>
           <a:p>
             <a:r>
@@ -4215,19 +4681,21 @@
         </p:nvSpPr>
         <p:spPr>
           <a:xfrm>
-            <a:off x="256902" y="2065119"/>
+            <a:off x="256901" y="1449276"/>
             <a:ext cx="7543801" cy="470746"/>
           </a:xfrm>
         </p:spPr>
         <p:txBody>
-          <a:bodyPr/>
+          <a:bodyPr>
+            <a:normAutofit lnSpcReduction="10000"/>
+          </a:bodyPr>
           <a:lstStyle/>
           <a:p>
             <a:r>
-              <a:rPr lang="en-US" dirty="0" smtClean="0"/>
+              <a:rPr lang="en-US" sz="2800" dirty="0" smtClean="0"/>
               <a:t>Uses a ’loop’ to make a series of plots</a:t>
             </a:r>
-            <a:endParaRPr lang="en-US" dirty="0"/>
+            <a:endParaRPr lang="en-US" sz="2800" dirty="0"/>
           </a:p>
         </p:txBody>
       </p:sp>
@@ -4299,7 +4767,7 @@
         </p:nvSpPr>
         <p:spPr>
           <a:xfrm>
-            <a:off x="256901" y="4685813"/>
+            <a:off x="256901" y="5006979"/>
             <a:ext cx="7543801" cy="470746"/>
           </a:xfrm>
           <a:prstGeom prst="rect">
@@ -4308,7 +4776,7 @@
         </p:spPr>
         <p:txBody>
           <a:bodyPr vert="horz" lIns="0" tIns="45720" rIns="0" bIns="45720" rtlCol="0">
-            <a:normAutofit/>
+            <a:noAutofit/>
           </a:bodyPr>
           <a:lstStyle>
             <a:lvl1pPr marL="91440" indent="-91440" algn="l" defTabSz="914400" rtl="0" eaLnBrk="1" latinLnBrk="0" hangingPunct="1">
@@ -4558,10 +5026,14 @@
           </a:lstStyle>
           <a:p>
             <a:r>
-              <a:rPr lang="en-US" dirty="0" smtClean="0"/>
-              <a:t>Then the package facilitates ‘combining’ them into an animation</a:t>
-            </a:r>
-            <a:endParaRPr lang="en-US" dirty="0"/>
+              <a:rPr lang="en-US" sz="3200" dirty="0" smtClean="0"/>
+              <a:t>Package ‘combines’ </a:t>
+            </a:r>
+            <a:r>
+              <a:rPr lang="en-US" sz="3200" dirty="0" smtClean="0"/>
+              <a:t>them into an animation</a:t>
+            </a:r>
+            <a:endParaRPr lang="en-US" sz="3200" dirty="0"/>
           </a:p>
         </p:txBody>
       </p:sp>
@@ -4650,7 +5122,6 @@
               <a:rPr lang="en-US" sz="2400" b="1" dirty="0"/>
               <a:t>2</a:t>
             </a:r>
-            <a:endParaRPr lang="en-US" sz="2400" b="1" dirty="0"/>
           </a:p>
         </p:txBody>
       </p:sp>
@@ -4680,7 +5151,6 @@
               <a:rPr lang="en-US" sz="2400" b="1" dirty="0"/>
               <a:t>3</a:t>
             </a:r>
-            <a:endParaRPr lang="en-US" sz="2400" b="1" dirty="0"/>
           </a:p>
         </p:txBody>
       </p:sp>
@@ -5023,8 +5493,8 @@
         </p:nvSpPr>
         <p:spPr>
           <a:xfrm>
-            <a:off x="307570" y="136975"/>
-            <a:ext cx="8404167" cy="1450757"/>
+            <a:off x="307570" y="136976"/>
+            <a:ext cx="8404167" cy="863150"/>
           </a:xfrm>
         </p:spPr>
         <p:txBody>
@@ -5526,8 +5996,8 @@
         </p:nvSpPr>
         <p:spPr>
           <a:xfrm>
-            <a:off x="6363971" y="2708365"/>
-            <a:ext cx="2672206" cy="369332"/>
+            <a:off x="5449571" y="2408327"/>
+            <a:ext cx="3494931" cy="461665"/>
           </a:xfrm>
           <a:prstGeom prst="rect">
             <a:avLst/>
@@ -5541,14 +6011,10 @@
           <a:lstStyle/>
           <a:p>
             <a:r>
-              <a:rPr lang="en-US" dirty="0" smtClean="0"/>
-              <a:t>Set </a:t>
-            </a:r>
-            <a:r>
-              <a:rPr lang="en-US" smtClean="0"/>
-              <a:t>visual parameters plot </a:t>
-            </a:r>
-            <a:endParaRPr lang="en-US" dirty="0"/>
+              <a:rPr lang="en-US" sz="2400" dirty="0" smtClean="0"/>
+              <a:t>Set visual parameters plot </a:t>
+            </a:r>
+            <a:endParaRPr lang="en-US" sz="2400" dirty="0"/>
           </a:p>
         </p:txBody>
       </p:sp>
@@ -5560,8 +6026,8 @@
         </p:nvSpPr>
         <p:spPr>
           <a:xfrm>
-            <a:off x="6363971" y="3461837"/>
-            <a:ext cx="2128147" cy="369332"/>
+            <a:off x="5449571" y="3161799"/>
+            <a:ext cx="2770630" cy="461665"/>
           </a:xfrm>
           <a:prstGeom prst="rect">
             <a:avLst/>
@@ -5575,10 +6041,10 @@
           <a:lstStyle/>
           <a:p>
             <a:r>
-              <a:rPr lang="en-US" dirty="0" smtClean="0"/>
+              <a:rPr lang="en-US" sz="2400" dirty="0" smtClean="0"/>
               <a:t>Run the visualization</a:t>
             </a:r>
-            <a:endParaRPr lang="en-US" dirty="0"/>
+            <a:endParaRPr lang="en-US" sz="2400" dirty="0"/>
           </a:p>
         </p:txBody>
       </p:sp>
@@ -5590,8 +6056,8 @@
         </p:nvSpPr>
         <p:spPr>
           <a:xfrm>
-            <a:off x="6363971" y="4524342"/>
-            <a:ext cx="2669000" cy="369332"/>
+            <a:off x="5449571" y="4224304"/>
+            <a:ext cx="3490123" cy="461665"/>
           </a:xfrm>
           <a:prstGeom prst="rect">
             <a:avLst/>
@@ -5605,10 +6071,10 @@
           <a:lstStyle/>
           <a:p>
             <a:r>
-              <a:rPr lang="en-US" dirty="0" smtClean="0"/>
+              <a:rPr lang="en-US" sz="2400" dirty="0" smtClean="0"/>
               <a:t>Set the output parameters</a:t>
             </a:r>
-            <a:endParaRPr lang="en-US" dirty="0"/>
+            <a:endParaRPr lang="en-US" sz="2400" dirty="0"/>
           </a:p>
         </p:txBody>
       </p:sp>
@@ -5661,7 +6127,9 @@
         </p:nvSpPr>
         <p:spPr/>
         <p:txBody>
-          <a:bodyPr/>
+          <a:bodyPr>
+            <a:normAutofit fontScale="90000"/>
+          </a:bodyPr>
           <a:lstStyle/>
           <a:p>
             <a:r>
@@ -5737,44 +6205,44 @@
 </file>
 
 <file path=ppt/theme/theme1.xml><?xml version="1.0" encoding="utf-8"?>
-<a:theme xmlns:a="http://schemas.openxmlformats.org/drawingml/2006/main" name="Retrospect">
+<a:theme xmlns:a="http://schemas.openxmlformats.org/drawingml/2006/main" name="Blues">
   <a:themeElements>
     <a:clrScheme name="Retrospect">
       <a:dk1>
-        <a:srgbClr val="000000"/>
+        <a:sysClr val="windowText" lastClr="000000"/>
       </a:dk1>
       <a:lt1>
         <a:sysClr val="window" lastClr="FFFFFF"/>
       </a:lt1>
       <a:dk2>
-        <a:srgbClr val="637052"/>
+        <a:srgbClr val="344068"/>
       </a:dk2>
       <a:lt2>
-        <a:srgbClr val="CCDDEA"/>
+        <a:srgbClr val="D9E0E6"/>
       </a:lt2>
       <a:accent1>
-        <a:srgbClr val="E48312"/>
+        <a:srgbClr val="1CADE4"/>
       </a:accent1>
       <a:accent2>
-        <a:srgbClr val="BD582C"/>
+        <a:srgbClr val="2683C6"/>
       </a:accent2>
       <a:accent3>
-        <a:srgbClr val="865640"/>
+        <a:srgbClr val="28C4CC"/>
       </a:accent3>
       <a:accent4>
-        <a:srgbClr val="9B8357"/>
+        <a:srgbClr val="42BA97"/>
       </a:accent4>
       <a:accent5>
-        <a:srgbClr val="C2BC80"/>
+        <a:srgbClr val="3E8853"/>
       </a:accent5>
       <a:accent6>
-        <a:srgbClr val="94A088"/>
+        <a:srgbClr val="62A39F"/>
       </a:accent6>
       <a:hlink>
-        <a:srgbClr val="2998E3"/>
+        <a:srgbClr val="6EAC1C"/>
       </a:hlink>
       <a:folHlink>
-        <a:srgbClr val="8C8C8C"/>
+        <a:srgbClr val="B26B02"/>
       </a:folHlink>
     </a:clrScheme>
     <a:fontScheme name="Retrospect">
@@ -6013,7 +6481,7 @@
   <a:extraClrSchemeLst/>
   <a:extLst>
     <a:ext uri="{05A4C25C-085E-4340-85A3-A5531E510DB2}">
-      <thm15:themeFamily xmlns:thm15="http://schemas.microsoft.com/office/thememl/2012/main" name="Retrospect" id="{5F128B03-DCCA-4EEB-AB3B-CF2899314A46}" vid="{3F1AAB62-24C6-49D2-8E01-B56FAC9A3DCD}"/>
+      <thm15:themeFamily xmlns:thm15="http://schemas.microsoft.com/office/thememl/2012/main" name="Blues" id="{031DF67F-A517-1F40-A9E3-9B99C78E9C4B}" vid="{354BE8AD-0555-AC4A-A89D-86E85505A204}"/>
     </a:ext>
   </a:extLst>
 </a:theme>

</xml_diff>